<commit_message>
Added powerpoint for Azure stack
</commit_message>
<xml_diff>
--- a/WDS/Whiteboard design session trainer presentation - Azure Stack.pptx
+++ b/WDS/Whiteboard design session trainer presentation - Azure Stack.pptx
@@ -1,47 +1,47 @@
 
 <file path=ppt/presentation.xml><?xml version="1.0" encoding="utf-8"?>
-<p:presentation xmlns:a="http://schemas.openxmlformats.org/drawingml/2006/main" xmlns:r="http://schemas.openxmlformats.org/officeDocument/2006/relationships" xmlns:p="http://schemas.openxmlformats.org/presentationml/2006/main" removePersonalInfoOnSave="1" saveSubsetFonts="1">
+<p:presentation xmlns:a="http://schemas.openxmlformats.org/drawingml/2006/main" xmlns:r="http://schemas.openxmlformats.org/officeDocument/2006/relationships" xmlns:p="http://schemas.openxmlformats.org/presentationml/2006/main" saveSubsetFonts="1">
   <p:sldMasterIdLst>
-    <p:sldMasterId id="2147483660" r:id="rId1"/>
-    <p:sldMasterId id="2147483665" r:id="rId2"/>
+    <p:sldMasterId id="2147483660" r:id="rId4"/>
+    <p:sldMasterId id="2147483665" r:id="rId5"/>
   </p:sldMasterIdLst>
   <p:notesMasterIdLst>
-    <p:notesMasterId r:id="rId36"/>
+    <p:notesMasterId r:id="rId39"/>
   </p:notesMasterIdLst>
   <p:sldIdLst>
-    <p:sldId id="300" r:id="rId3"/>
-    <p:sldId id="323" r:id="rId4"/>
-    <p:sldId id="302" r:id="rId5"/>
-    <p:sldId id="259" r:id="rId6"/>
-    <p:sldId id="324" r:id="rId7"/>
-    <p:sldId id="354" r:id="rId8"/>
-    <p:sldId id="327" r:id="rId9"/>
-    <p:sldId id="363" r:id="rId10"/>
-    <p:sldId id="326" r:id="rId11"/>
-    <p:sldId id="330" r:id="rId12"/>
-    <p:sldId id="303" r:id="rId13"/>
-    <p:sldId id="331" r:id="rId14"/>
-    <p:sldId id="305" r:id="rId15"/>
-    <p:sldId id="320" r:id="rId16"/>
-    <p:sldId id="322" r:id="rId17"/>
-    <p:sldId id="321" r:id="rId18"/>
-    <p:sldId id="317" r:id="rId19"/>
-    <p:sldId id="338" r:id="rId20"/>
-    <p:sldId id="343" r:id="rId21"/>
-    <p:sldId id="357" r:id="rId22"/>
-    <p:sldId id="340" r:id="rId23"/>
-    <p:sldId id="359" r:id="rId24"/>
-    <p:sldId id="360" r:id="rId25"/>
-    <p:sldId id="358" r:id="rId26"/>
-    <p:sldId id="362" r:id="rId27"/>
-    <p:sldId id="342" r:id="rId28"/>
-    <p:sldId id="356" r:id="rId29"/>
-    <p:sldId id="349" r:id="rId30"/>
-    <p:sldId id="352" r:id="rId31"/>
-    <p:sldId id="353" r:id="rId32"/>
-    <p:sldId id="351" r:id="rId33"/>
-    <p:sldId id="318" r:id="rId34"/>
-    <p:sldId id="315" r:id="rId35"/>
+    <p:sldId id="300" r:id="rId6"/>
+    <p:sldId id="323" r:id="rId7"/>
+    <p:sldId id="302" r:id="rId8"/>
+    <p:sldId id="259" r:id="rId9"/>
+    <p:sldId id="324" r:id="rId10"/>
+    <p:sldId id="354" r:id="rId11"/>
+    <p:sldId id="327" r:id="rId12"/>
+    <p:sldId id="361" r:id="rId13"/>
+    <p:sldId id="326" r:id="rId14"/>
+    <p:sldId id="330" r:id="rId15"/>
+    <p:sldId id="303" r:id="rId16"/>
+    <p:sldId id="331" r:id="rId17"/>
+    <p:sldId id="305" r:id="rId18"/>
+    <p:sldId id="320" r:id="rId19"/>
+    <p:sldId id="322" r:id="rId20"/>
+    <p:sldId id="321" r:id="rId21"/>
+    <p:sldId id="317" r:id="rId22"/>
+    <p:sldId id="338" r:id="rId23"/>
+    <p:sldId id="343" r:id="rId24"/>
+    <p:sldId id="357" r:id="rId25"/>
+    <p:sldId id="340" r:id="rId26"/>
+    <p:sldId id="359" r:id="rId27"/>
+    <p:sldId id="360" r:id="rId28"/>
+    <p:sldId id="358" r:id="rId29"/>
+    <p:sldId id="362" r:id="rId30"/>
+    <p:sldId id="342" r:id="rId31"/>
+    <p:sldId id="356" r:id="rId32"/>
+    <p:sldId id="349" r:id="rId33"/>
+    <p:sldId id="352" r:id="rId34"/>
+    <p:sldId id="353" r:id="rId35"/>
+    <p:sldId id="351" r:id="rId36"/>
+    <p:sldId id="318" r:id="rId37"/>
+    <p:sldId id="315" r:id="rId38"/>
   </p:sldIdLst>
   <p:sldSz cx="12192000" cy="6858000"/>
   <p:notesSz cx="6858000" cy="9144000"/>
@@ -144,16 +144,33 @@
     <p:ext uri="{EFAFB233-063F-42B5-8137-9DF3F51BA10A}">
       <p15:sldGuideLst xmlns:p15="http://schemas.microsoft.com/office/powerpoint/2012/main"/>
     </p:ext>
-    <p:ext uri="{2D200454-40CA-4A62-9FC3-DE9A4176ACB9}">
-      <p15:notesGuideLst xmlns:p15="http://schemas.microsoft.com/office/powerpoint/2012/main"/>
-    </p:ext>
   </p:extLst>
 </p:presentation>
 </file>
 
 <file path=ppt/commentAuthors.xml><?xml version="1.0" encoding="utf-8"?>
 <p:cmAuthorLst xmlns:a="http://schemas.openxmlformats.org/drawingml/2006/main" xmlns:r="http://schemas.openxmlformats.org/officeDocument/2006/relationships" xmlns:p="http://schemas.openxmlformats.org/presentationml/2006/main">
-  <p:cmAuthor id="4" name="Author" initials="A" lastIdx="0" clrIdx="3"/>
+  <p:cmAuthor id="1" name="Steve Buchanan" initials="SB" lastIdx="2" clrIdx="0">
+    <p:extLst>
+      <p:ext uri="{19B8F6BF-5375-455C-9EA6-DF929625EA0E}">
+        <p15:presenceInfo xmlns:p15="http://schemas.microsoft.com/office/powerpoint/2012/main" userId="75e6bc1c2aa61b7a" providerId="Windows Live"/>
+      </p:ext>
+    </p:extLst>
+  </p:cmAuthor>
+  <p:cmAuthor id="2" name="James Burleson" initials="JB" lastIdx="1" clrIdx="1">
+    <p:extLst>
+      <p:ext uri="{19B8F6BF-5375-455C-9EA6-DF929625EA0E}">
+        <p15:presenceInfo xmlns:p15="http://schemas.microsoft.com/office/powerpoint/2012/main" userId="James Burleson" providerId="None"/>
+      </p:ext>
+    </p:extLst>
+  </p:cmAuthor>
+  <p:cmAuthor id="3" name="Sandy Alto (GP Strategies Corporation)" initials="SA(SC" lastIdx="1" clrIdx="2">
+    <p:extLst>
+      <p:ext uri="{19B8F6BF-5375-455C-9EA6-DF929625EA0E}">
+        <p15:presenceInfo xmlns:p15="http://schemas.microsoft.com/office/powerpoint/2012/main" userId="S-1-5-21-2127521184-1604012920-1887927527-29333883" providerId="AD"/>
+      </p:ext>
+    </p:extLst>
+  </p:cmAuthor>
 </p:cmAuthorLst>
 </file>
 
@@ -161,9 +178,22 @@
 <p1510:revInfo xmlns:a="http://schemas.openxmlformats.org/drawingml/2006/main" xmlns:r="http://schemas.openxmlformats.org/officeDocument/2006/relationships" xmlns:p1510="http://schemas.microsoft.com/office/powerpoint/2015/10/main">
   <p1510:revLst>
     <p1510:client id="{D8E47FE5-9C48-442E-BEE4-0E76DDF939BF}" v="1" dt="2018-05-08T17:30:14.592"/>
-    <p1510:client id="{E751B45D-8D24-4A38-A964-EB6CA9396333}" v="1" dt="2018-05-08T17:49:46.861"/>
   </p1510:revLst>
 </p1510:revInfo>
+</file>
+
+<file path=ppt/comments/comment1.xml><?xml version="1.0" encoding="utf-8"?>
+<p:cmLst xmlns:a="http://schemas.openxmlformats.org/drawingml/2006/main" xmlns:r="http://schemas.openxmlformats.org/officeDocument/2006/relationships" xmlns:p="http://schemas.openxmlformats.org/presentationml/2006/main">
+  <p:cm authorId="3" dt="2018-05-01T19:55:09.513" idx="1">
+    <p:pos x="10" y="10"/>
+    <p:text>Sent meail to Michael and James re tech accuracy of this slide.</p:text>
+    <p:extLst>
+      <p:ext uri="{C676402C-5697-4E1C-873F-D02D1690AC5C}">
+        <p15:threadingInfo xmlns:p15="http://schemas.microsoft.com/office/powerpoint/2012/main" timeZoneBias="420"/>
+      </p:ext>
+    </p:extLst>
+  </p:cm>
+</p:cmLst>
 </file>
 
 <file path=ppt/notesMasters/notesMaster1.xml><?xml version="1.0" encoding="utf-8"?>
@@ -248,7 +278,7 @@
           <a:p>
             <a:fld id="{52A13B17-C506-4D51-BB37-16B365906619}" type="datetimeFigureOut">
               <a:rPr lang="en-US" smtClean="0"/>
-              <a:t>5/24/2018</a:t>
+              <a:t>6/7/2018</a:t>
             </a:fld>
             <a:endParaRPr lang="en-US"/>
           </a:p>
@@ -560,7 +590,7 @@
           <a:lstStyle/>
           <a:p>
             <a:r>
-              <a:rPr lang="en-US" sz="950" kern="1200" dirty="0">
+              <a:rPr lang="en-US" sz="1200" kern="1200" dirty="0">
                 <a:solidFill>
                   <a:schemeClr val="tx1"/>
                 </a:solidFill>
@@ -574,7 +604,7 @@
           </a:p>
           <a:p>
             <a:r>
-              <a:rPr lang="en-US" sz="950" kern="1200" dirty="0">
+              <a:rPr lang="en-US" sz="1200" kern="1200" dirty="0">
                 <a:solidFill>
                   <a:schemeClr val="tx1"/>
                 </a:solidFill>
@@ -588,7 +618,7 @@
           </a:p>
           <a:p>
             <a:r>
-              <a:rPr lang="en-US" sz="950" kern="1200" dirty="0">
+              <a:rPr lang="en-US" sz="1200" kern="1200" dirty="0">
                 <a:solidFill>
                   <a:schemeClr val="tx1"/>
                 </a:solidFill>
@@ -602,7 +632,7 @@
           </a:p>
           <a:p>
             <a:r>
-              <a:rPr lang="en-US" sz="950" kern="1200" dirty="0">
+              <a:rPr lang="en-US" sz="1200" kern="1200" dirty="0">
                 <a:solidFill>
                   <a:schemeClr val="tx1"/>
                 </a:solidFill>
@@ -616,7 +646,7 @@
           </a:p>
           <a:p>
             <a:r>
-              <a:rPr lang="en-US" sz="950" kern="1200" dirty="0">
+              <a:rPr lang="en-US" sz="1200" kern="1200" dirty="0">
                 <a:solidFill>
                   <a:schemeClr val="tx1"/>
                 </a:solidFill>
@@ -628,7 +658,7 @@
               <a:t>Microsoft and the trademarks listed at </a:t>
             </a:r>
             <a:r>
-              <a:rPr lang="en-US" sz="950" u="sng" kern="1200" dirty="0">
+              <a:rPr lang="en-US" sz="1200" u="sng" kern="1200" dirty="0">
                 <a:solidFill>
                   <a:schemeClr val="tx1"/>
                 </a:solidFill>
@@ -641,7 +671,7 @@
               <a:t>https://www.microsoft.com/en-us/legal/intellectualproperty/Trademarks/Usage/General.aspx</a:t>
             </a:r>
             <a:r>
-              <a:rPr lang="en-US" sz="950" kern="1200" dirty="0">
+              <a:rPr lang="en-US" sz="1200" kern="1200" dirty="0">
                 <a:solidFill>
                   <a:schemeClr val="tx1"/>
                 </a:solidFill>
@@ -652,6 +682,34 @@
               </a:rPr>
               <a:t> are trademarks of the Microsoft group of companies. All other trademarks are property of their respective owners.</a:t>
             </a:r>
+          </a:p>
+          <a:p>
+            <a:br>
+              <a:rPr lang="en-US" sz="1200" kern="1200">
+                <a:solidFill>
+                  <a:schemeClr val="tx1"/>
+                </a:solidFill>
+                <a:effectLst/>
+                <a:latin typeface="+mn-lt"/>
+                <a:ea typeface="+mn-ea"/>
+                <a:cs typeface="+mn-cs"/>
+              </a:rPr>
+            </a:br>
+            <a:r>
+              <a:rPr lang="en-US" sz="1200" kern="1200">
+                <a:solidFill>
+                  <a:schemeClr val="tx1"/>
+                </a:solidFill>
+                <a:effectLst/>
+                <a:latin typeface="+mn-lt"/>
+                <a:ea typeface="+mn-ea"/>
+                <a:cs typeface="+mn-cs"/>
+              </a:rPr>
+              <a:t> </a:t>
+            </a:r>
+          </a:p>
+          <a:p>
+            <a:endParaRPr lang="en-US" dirty="0"/>
           </a:p>
         </p:txBody>
       </p:sp>
@@ -721,7 +779,7 @@
               </a:pPr>
               <a:t>1</a:t>
             </a:fld>
-            <a:endParaRPr kumimoji="0" lang="en-US" sz="1200" b="0" i="0" u="none" strike="noStrike" kern="1200" cap="none" spc="0" normalizeH="0" baseline="0" noProof="0" dirty="0">
+            <a:endParaRPr kumimoji="0" lang="en-US" sz="1200" b="0" i="0" u="none" strike="noStrike" kern="1200" cap="none" spc="0" normalizeH="0" baseline="0" noProof="0">
               <a:ln>
                 <a:noFill/>
               </a:ln>
@@ -795,7 +853,7 @@
           <a:bodyPr/>
           <a:lstStyle/>
           <a:p>
-            <a:endParaRPr lang="en-US" dirty="0"/>
+            <a:endParaRPr lang="en-US"/>
           </a:p>
         </p:txBody>
       </p:sp>
@@ -816,7 +874,7 @@
           <a:p>
             <a:fld id="{0998D5BB-B127-481F-BC0A-2F77C576BB34}" type="slidenum">
               <a:rPr lang="en-US" smtClean="0"/>
-              <a:t>11</a:t>
+              <a:t>10</a:t>
             </a:fld>
             <a:endParaRPr lang="en-US"/>
           </a:p>
@@ -825,7 +883,7 @@
     </p:spTree>
     <p:extLst>
       <p:ext uri="{BB962C8B-B14F-4D97-AF65-F5344CB8AC3E}">
-        <p14:creationId xmlns:p14="http://schemas.microsoft.com/office/powerpoint/2010/main" val="3292433888"/>
+        <p14:creationId xmlns:p14="http://schemas.microsoft.com/office/powerpoint/2010/main" val="2356007107"/>
       </p:ext>
     </p:extLst>
   </p:cSld>
@@ -879,7 +937,7 @@
           <a:bodyPr/>
           <a:lstStyle/>
           <a:p>
-            <a:endParaRPr lang="en-US"/>
+            <a:endParaRPr lang="en-US" dirty="0"/>
           </a:p>
         </p:txBody>
       </p:sp>
@@ -900,7 +958,7 @@
           <a:p>
             <a:fld id="{0998D5BB-B127-481F-BC0A-2F77C576BB34}" type="slidenum">
               <a:rPr lang="en-US" smtClean="0"/>
-              <a:t>12</a:t>
+              <a:t>11</a:t>
             </a:fld>
             <a:endParaRPr lang="en-US"/>
           </a:p>
@@ -909,7 +967,7 @@
     </p:spTree>
     <p:extLst>
       <p:ext uri="{BB962C8B-B14F-4D97-AF65-F5344CB8AC3E}">
-        <p14:creationId xmlns:p14="http://schemas.microsoft.com/office/powerpoint/2010/main" val="3994004887"/>
+        <p14:creationId xmlns:p14="http://schemas.microsoft.com/office/powerpoint/2010/main" val="3292433888"/>
       </p:ext>
     </p:extLst>
   </p:cSld>
@@ -984,7 +1042,7 @@
           <a:p>
             <a:fld id="{0998D5BB-B127-481F-BC0A-2F77C576BB34}" type="slidenum">
               <a:rPr lang="en-US" smtClean="0"/>
-              <a:t>13</a:t>
+              <a:t>12</a:t>
             </a:fld>
             <a:endParaRPr lang="en-US"/>
           </a:p>
@@ -993,7 +1051,7 @@
     </p:spTree>
     <p:extLst>
       <p:ext uri="{BB962C8B-B14F-4D97-AF65-F5344CB8AC3E}">
-        <p14:creationId xmlns:p14="http://schemas.microsoft.com/office/powerpoint/2010/main" val="1267405105"/>
+        <p14:creationId xmlns:p14="http://schemas.microsoft.com/office/powerpoint/2010/main" val="3994004887"/>
       </p:ext>
     </p:extLst>
   </p:cSld>
@@ -1047,7 +1105,7 @@
           <a:bodyPr/>
           <a:lstStyle/>
           <a:p>
-            <a:endParaRPr lang="en-US" dirty="0"/>
+            <a:endParaRPr lang="en-US"/>
           </a:p>
         </p:txBody>
       </p:sp>
@@ -1068,7 +1126,7 @@
           <a:p>
             <a:fld id="{0998D5BB-B127-481F-BC0A-2F77C576BB34}" type="slidenum">
               <a:rPr lang="en-US" smtClean="0"/>
-              <a:t>14</a:t>
+              <a:t>13</a:t>
             </a:fld>
             <a:endParaRPr lang="en-US"/>
           </a:p>
@@ -1077,7 +1135,7 @@
     </p:spTree>
     <p:extLst>
       <p:ext uri="{BB962C8B-B14F-4D97-AF65-F5344CB8AC3E}">
-        <p14:creationId xmlns:p14="http://schemas.microsoft.com/office/powerpoint/2010/main" val="3229744285"/>
+        <p14:creationId xmlns:p14="http://schemas.microsoft.com/office/powerpoint/2010/main" val="1267405105"/>
       </p:ext>
     </p:extLst>
   </p:cSld>
@@ -1152,7 +1210,7 @@
           <a:p>
             <a:fld id="{0998D5BB-B127-481F-BC0A-2F77C576BB34}" type="slidenum">
               <a:rPr lang="en-US" smtClean="0"/>
-              <a:t>15</a:t>
+              <a:t>14</a:t>
             </a:fld>
             <a:endParaRPr lang="en-US"/>
           </a:p>
@@ -1161,7 +1219,7 @@
     </p:spTree>
     <p:extLst>
       <p:ext uri="{BB962C8B-B14F-4D97-AF65-F5344CB8AC3E}">
-        <p14:creationId xmlns:p14="http://schemas.microsoft.com/office/powerpoint/2010/main" val="251902611"/>
+        <p14:creationId xmlns:p14="http://schemas.microsoft.com/office/powerpoint/2010/main" val="3229744285"/>
       </p:ext>
     </p:extLst>
   </p:cSld>
@@ -1236,7 +1294,7 @@
           <a:p>
             <a:fld id="{0998D5BB-B127-481F-BC0A-2F77C576BB34}" type="slidenum">
               <a:rPr lang="en-US" smtClean="0"/>
-              <a:t>16</a:t>
+              <a:t>15</a:t>
             </a:fld>
             <a:endParaRPr lang="en-US"/>
           </a:p>
@@ -1245,7 +1303,7 @@
     </p:spTree>
     <p:extLst>
       <p:ext uri="{BB962C8B-B14F-4D97-AF65-F5344CB8AC3E}">
-        <p14:creationId xmlns:p14="http://schemas.microsoft.com/office/powerpoint/2010/main" val="1579283386"/>
+        <p14:creationId xmlns:p14="http://schemas.microsoft.com/office/powerpoint/2010/main" val="251902611"/>
       </p:ext>
     </p:extLst>
   </p:cSld>
@@ -1299,7 +1357,7 @@
           <a:bodyPr/>
           <a:lstStyle/>
           <a:p>
-            <a:endParaRPr lang="en-US"/>
+            <a:endParaRPr lang="en-US" dirty="0"/>
           </a:p>
         </p:txBody>
       </p:sp>
@@ -1320,7 +1378,7 @@
           <a:p>
             <a:fld id="{0998D5BB-B127-481F-BC0A-2F77C576BB34}" type="slidenum">
               <a:rPr lang="en-US" smtClean="0"/>
-              <a:t>17</a:t>
+              <a:t>16</a:t>
             </a:fld>
             <a:endParaRPr lang="en-US"/>
           </a:p>
@@ -1329,7 +1387,7 @@
     </p:spTree>
     <p:extLst>
       <p:ext uri="{BB962C8B-B14F-4D97-AF65-F5344CB8AC3E}">
-        <p14:creationId xmlns:p14="http://schemas.microsoft.com/office/powerpoint/2010/main" val="647674203"/>
+        <p14:creationId xmlns:p14="http://schemas.microsoft.com/office/powerpoint/2010/main" val="1579283386"/>
       </p:ext>
     </p:extLst>
   </p:cSld>
@@ -1383,7 +1441,7 @@
           <a:bodyPr/>
           <a:lstStyle/>
           <a:p>
-            <a:endParaRPr lang="en-US" dirty="0"/>
+            <a:endParaRPr lang="en-US"/>
           </a:p>
         </p:txBody>
       </p:sp>
@@ -1404,7 +1462,7 @@
           <a:p>
             <a:fld id="{0998D5BB-B127-481F-BC0A-2F77C576BB34}" type="slidenum">
               <a:rPr lang="en-US" smtClean="0"/>
-              <a:t>18</a:t>
+              <a:t>17</a:t>
             </a:fld>
             <a:endParaRPr lang="en-US"/>
           </a:p>
@@ -1413,7 +1471,7 @@
     </p:spTree>
     <p:extLst>
       <p:ext uri="{BB962C8B-B14F-4D97-AF65-F5344CB8AC3E}">
-        <p14:creationId xmlns:p14="http://schemas.microsoft.com/office/powerpoint/2010/main" val="3732585128"/>
+        <p14:creationId xmlns:p14="http://schemas.microsoft.com/office/powerpoint/2010/main" val="647674203"/>
       </p:ext>
     </p:extLst>
   </p:cSld>
@@ -1488,7 +1546,7 @@
           <a:p>
             <a:fld id="{0998D5BB-B127-481F-BC0A-2F77C576BB34}" type="slidenum">
               <a:rPr lang="en-US" smtClean="0"/>
-              <a:t>19</a:t>
+              <a:t>18</a:t>
             </a:fld>
             <a:endParaRPr lang="en-US"/>
           </a:p>
@@ -1497,7 +1555,7 @@
     </p:spTree>
     <p:extLst>
       <p:ext uri="{BB962C8B-B14F-4D97-AF65-F5344CB8AC3E}">
-        <p14:creationId xmlns:p14="http://schemas.microsoft.com/office/powerpoint/2010/main" val="3866924809"/>
+        <p14:creationId xmlns:p14="http://schemas.microsoft.com/office/powerpoint/2010/main" val="3732585128"/>
       </p:ext>
     </p:extLst>
   </p:cSld>
@@ -1551,7 +1609,7 @@
           <a:bodyPr/>
           <a:lstStyle/>
           <a:p>
-            <a:endParaRPr lang="en-US"/>
+            <a:endParaRPr lang="en-US" dirty="0"/>
           </a:p>
         </p:txBody>
       </p:sp>
@@ -1572,7 +1630,7 @@
           <a:p>
             <a:fld id="{0998D5BB-B127-481F-BC0A-2F77C576BB34}" type="slidenum">
               <a:rPr lang="en-US" smtClean="0"/>
-              <a:t>20</a:t>
+              <a:t>19</a:t>
             </a:fld>
             <a:endParaRPr lang="en-US"/>
           </a:p>
@@ -1581,7 +1639,7 @@
     </p:spTree>
     <p:extLst>
       <p:ext uri="{BB962C8B-B14F-4D97-AF65-F5344CB8AC3E}">
-        <p14:creationId xmlns:p14="http://schemas.microsoft.com/office/powerpoint/2010/main" val="122040222"/>
+        <p14:creationId xmlns:p14="http://schemas.microsoft.com/office/powerpoint/2010/main" val="3866924809"/>
       </p:ext>
     </p:extLst>
   </p:cSld>
@@ -1658,7 +1716,7 @@
               <a:rPr lang="en-US" smtClean="0"/>
               <a:t>2</a:t>
             </a:fld>
-            <a:endParaRPr lang="en-US" dirty="0"/>
+            <a:endParaRPr lang="en-US"/>
           </a:p>
         </p:txBody>
       </p:sp>
@@ -1740,7 +1798,7 @@
           <a:p>
             <a:fld id="{0998D5BB-B127-481F-BC0A-2F77C576BB34}" type="slidenum">
               <a:rPr lang="en-US" smtClean="0"/>
-              <a:t>21</a:t>
+              <a:t>20</a:t>
             </a:fld>
             <a:endParaRPr lang="en-US"/>
           </a:p>
@@ -1749,7 +1807,7 @@
     </p:spTree>
     <p:extLst>
       <p:ext uri="{BB962C8B-B14F-4D97-AF65-F5344CB8AC3E}">
-        <p14:creationId xmlns:p14="http://schemas.microsoft.com/office/powerpoint/2010/main" val="686217087"/>
+        <p14:creationId xmlns:p14="http://schemas.microsoft.com/office/powerpoint/2010/main" val="122040222"/>
       </p:ext>
     </p:extLst>
   </p:cSld>
@@ -1824,7 +1882,7 @@
           <a:p>
             <a:fld id="{0998D5BB-B127-481F-BC0A-2F77C576BB34}" type="slidenum">
               <a:rPr lang="en-US" smtClean="0"/>
-              <a:t>22</a:t>
+              <a:t>21</a:t>
             </a:fld>
             <a:endParaRPr lang="en-US"/>
           </a:p>
@@ -1833,7 +1891,7 @@
     </p:spTree>
     <p:extLst>
       <p:ext uri="{BB962C8B-B14F-4D97-AF65-F5344CB8AC3E}">
-        <p14:creationId xmlns:p14="http://schemas.microsoft.com/office/powerpoint/2010/main" val="729092707"/>
+        <p14:creationId xmlns:p14="http://schemas.microsoft.com/office/powerpoint/2010/main" val="686217087"/>
       </p:ext>
     </p:extLst>
   </p:cSld>
@@ -1908,7 +1966,7 @@
           <a:p>
             <a:fld id="{0998D5BB-B127-481F-BC0A-2F77C576BB34}" type="slidenum">
               <a:rPr lang="en-US" smtClean="0"/>
-              <a:t>23</a:t>
+              <a:t>22</a:t>
             </a:fld>
             <a:endParaRPr lang="en-US"/>
           </a:p>
@@ -1917,7 +1975,7 @@
     </p:spTree>
     <p:extLst>
       <p:ext uri="{BB962C8B-B14F-4D97-AF65-F5344CB8AC3E}">
-        <p14:creationId xmlns:p14="http://schemas.microsoft.com/office/powerpoint/2010/main" val="3293172015"/>
+        <p14:creationId xmlns:p14="http://schemas.microsoft.com/office/powerpoint/2010/main" val="729092707"/>
       </p:ext>
     </p:extLst>
   </p:cSld>
@@ -1992,7 +2050,7 @@
           <a:p>
             <a:fld id="{0998D5BB-B127-481F-BC0A-2F77C576BB34}" type="slidenum">
               <a:rPr lang="en-US" smtClean="0"/>
-              <a:t>24</a:t>
+              <a:t>23</a:t>
             </a:fld>
             <a:endParaRPr lang="en-US"/>
           </a:p>
@@ -2001,7 +2059,7 @@
     </p:spTree>
     <p:extLst>
       <p:ext uri="{BB962C8B-B14F-4D97-AF65-F5344CB8AC3E}">
-        <p14:creationId xmlns:p14="http://schemas.microsoft.com/office/powerpoint/2010/main" val="2711918252"/>
+        <p14:creationId xmlns:p14="http://schemas.microsoft.com/office/powerpoint/2010/main" val="3293172015"/>
       </p:ext>
     </p:extLst>
   </p:cSld>
@@ -2055,80 +2113,7 @@
           <a:bodyPr/>
           <a:lstStyle/>
           <a:p>
-            <a:r>
-              <a:rPr lang="en-US" sz="1200" kern="1200" dirty="0">
-                <a:solidFill>
-                  <a:schemeClr val="tx1"/>
-                </a:solidFill>
-                <a:effectLst/>
-                <a:latin typeface="+mn-lt"/>
-                <a:ea typeface="+mn-ea"/>
-                <a:cs typeface="+mn-cs"/>
-              </a:rPr>
-              <a:t>Azure Resource Manager templates can be used to deploy supported services to both Azure Public and Azure Stack. </a:t>
-            </a:r>
-          </a:p>
-          <a:p>
-            <a:r>
-              <a:rPr lang="en-US" sz="1200" kern="1200" dirty="0">
-                <a:solidFill>
-                  <a:schemeClr val="tx1"/>
-                </a:solidFill>
-                <a:effectLst/>
-                <a:latin typeface="+mn-lt"/>
-                <a:ea typeface="+mn-ea"/>
-                <a:cs typeface="+mn-cs"/>
-              </a:rPr>
-              <a:t>A hybrid continuous integration/continuous delivery(CI/CD) pipeline enables you to build, test, and deploy your app to multiple clouds. A hybrid CI/CD pipeline can help you:</a:t>
-            </a:r>
-          </a:p>
-          <a:p>
-            <a:pPr lvl="0"/>
-            <a:r>
-              <a:rPr lang="en-US" sz="1200" kern="1200" dirty="0">
-                <a:solidFill>
-                  <a:schemeClr val="tx1"/>
-                </a:solidFill>
-                <a:effectLst/>
-                <a:latin typeface="+mn-lt"/>
-                <a:ea typeface="+mn-ea"/>
-                <a:cs typeface="+mn-cs"/>
-              </a:rPr>
-              <a:t>Initiate a new build based on code commits to your Visual Studio Team Services (VSTS) repository.</a:t>
-            </a:r>
-          </a:p>
-          <a:p>
-            <a:pPr lvl="0"/>
-            <a:r>
-              <a:rPr lang="en-US" sz="1200" kern="1200" dirty="0">
-                <a:solidFill>
-                  <a:schemeClr val="tx1"/>
-                </a:solidFill>
-                <a:effectLst/>
-                <a:latin typeface="+mn-lt"/>
-                <a:ea typeface="+mn-ea"/>
-                <a:cs typeface="+mn-cs"/>
-              </a:rPr>
-              <a:t>Automatically deploy your newly built code to Azure for user acceptance testing.</a:t>
-            </a:r>
-          </a:p>
-          <a:p>
-            <a:pPr lvl="0"/>
-            <a:r>
-              <a:rPr lang="en-US" sz="1200" kern="1200" dirty="0">
-                <a:solidFill>
-                  <a:schemeClr val="tx1"/>
-                </a:solidFill>
-                <a:effectLst/>
-                <a:latin typeface="+mn-lt"/>
-                <a:ea typeface="+mn-ea"/>
-                <a:cs typeface="+mn-cs"/>
-              </a:rPr>
-              <a:t>Once your code has passed testing, automatically deploy to Azure Stack.</a:t>
-            </a:r>
-          </a:p>
-          <a:p>
-            <a:endParaRPr lang="en-US" dirty="0"/>
+            <a:endParaRPr lang="en-US"/>
           </a:p>
         </p:txBody>
       </p:sp>
@@ -2149,7 +2134,7 @@
           <a:p>
             <a:fld id="{0998D5BB-B127-481F-BC0A-2F77C576BB34}" type="slidenum">
               <a:rPr lang="en-US" smtClean="0"/>
-              <a:t>25</a:t>
+              <a:t>24</a:t>
             </a:fld>
             <a:endParaRPr lang="en-US"/>
           </a:p>
@@ -2158,7 +2143,7 @@
     </p:spTree>
     <p:extLst>
       <p:ext uri="{BB962C8B-B14F-4D97-AF65-F5344CB8AC3E}">
-        <p14:creationId xmlns:p14="http://schemas.microsoft.com/office/powerpoint/2010/main" val="4073144030"/>
+        <p14:creationId xmlns:p14="http://schemas.microsoft.com/office/powerpoint/2010/main" val="2711918252"/>
       </p:ext>
     </p:extLst>
   </p:cSld>
@@ -2212,7 +2197,6 @@
           <a:bodyPr/>
           <a:lstStyle/>
           <a:p>
-            <a:pPr lvl="0"/>
             <a:r>
               <a:rPr lang="en-US" sz="1200" kern="1200" dirty="0">
                 <a:solidFill>
@@ -2223,7 +2207,7 @@
                 <a:ea typeface="+mn-ea"/>
                 <a:cs typeface="+mn-cs"/>
               </a:rPr>
-              <a:t>The initial proof of concept will start with providing a S2S VPN between the virtual network the Azure Web App is connected to and Azure Stack and another S2S Gateway between the Azure Stack Datacenter in FT and the Contoso Regional HQ. </a:t>
+              <a:t>Azure Resource Manager templates can be used to deploy supported services to both Azure Public and Azure Stack. </a:t>
             </a:r>
           </a:p>
           <a:p>
@@ -2237,8 +2221,55 @@
                 <a:ea typeface="+mn-ea"/>
                 <a:cs typeface="+mn-cs"/>
               </a:rPr>
-              <a:t>For the future, both S2S and ExpressRoute will be configured for routing using BGP ensuring the best connections possible and one set of configurations for routing.  FT will provide the Public ASN number for the routes from their datacenter network in Dallas.  FT will also configure the BGP connections between their datacenter and the new routers on-premises at the Contoso Dallas office. Contoso’s Public IP Space will be leveraged along with the addition of public IP Space from FT.</a:t>
-            </a:r>
+              <a:t>A hybrid continuous integration/continuous delivery(CI/CD) pipeline enables you to build, test, and deploy your app to multiple clouds. A hybrid CI/CD pipeline can help you:</a:t>
+            </a:r>
+          </a:p>
+          <a:p>
+            <a:pPr lvl="0"/>
+            <a:r>
+              <a:rPr lang="en-US" sz="1200" kern="1200" dirty="0">
+                <a:solidFill>
+                  <a:schemeClr val="tx1"/>
+                </a:solidFill>
+                <a:effectLst/>
+                <a:latin typeface="+mn-lt"/>
+                <a:ea typeface="+mn-ea"/>
+                <a:cs typeface="+mn-cs"/>
+              </a:rPr>
+              <a:t>Initiate a new build based on code commits to your Visual Studio Team Services (VSTS) repository.</a:t>
+            </a:r>
+          </a:p>
+          <a:p>
+            <a:pPr lvl="0"/>
+            <a:r>
+              <a:rPr lang="en-US" sz="1200" kern="1200" dirty="0">
+                <a:solidFill>
+                  <a:schemeClr val="tx1"/>
+                </a:solidFill>
+                <a:effectLst/>
+                <a:latin typeface="+mn-lt"/>
+                <a:ea typeface="+mn-ea"/>
+                <a:cs typeface="+mn-cs"/>
+              </a:rPr>
+              <a:t>Automatically deploy your newly built code to Azure for user acceptance testing.</a:t>
+            </a:r>
+          </a:p>
+          <a:p>
+            <a:pPr lvl="0"/>
+            <a:r>
+              <a:rPr lang="en-US" sz="1200" kern="1200" dirty="0">
+                <a:solidFill>
+                  <a:schemeClr val="tx1"/>
+                </a:solidFill>
+                <a:effectLst/>
+                <a:latin typeface="+mn-lt"/>
+                <a:ea typeface="+mn-ea"/>
+                <a:cs typeface="+mn-cs"/>
+              </a:rPr>
+              <a:t>Once your code has passed testing, automatically deploy to Azure Stack.</a:t>
+            </a:r>
+          </a:p>
+          <a:p>
             <a:endParaRPr lang="en-US" dirty="0"/>
           </a:p>
         </p:txBody>
@@ -2260,7 +2291,7 @@
           <a:p>
             <a:fld id="{0998D5BB-B127-481F-BC0A-2F77C576BB34}" type="slidenum">
               <a:rPr lang="en-US" smtClean="0"/>
-              <a:t>26</a:t>
+              <a:t>25</a:t>
             </a:fld>
             <a:endParaRPr lang="en-US"/>
           </a:p>
@@ -2269,7 +2300,7 @@
     </p:spTree>
     <p:extLst>
       <p:ext uri="{BB962C8B-B14F-4D97-AF65-F5344CB8AC3E}">
-        <p14:creationId xmlns:p14="http://schemas.microsoft.com/office/powerpoint/2010/main" val="3168858057"/>
+        <p14:creationId xmlns:p14="http://schemas.microsoft.com/office/powerpoint/2010/main" val="4073144030"/>
       </p:ext>
     </p:extLst>
   </p:cSld>
@@ -2323,7 +2354,34 @@
           <a:bodyPr/>
           <a:lstStyle/>
           <a:p>
-            <a:endParaRPr lang="en-US"/>
+            <a:pPr lvl="0"/>
+            <a:r>
+              <a:rPr lang="en-US" sz="1200" kern="1200" dirty="0">
+                <a:solidFill>
+                  <a:schemeClr val="tx1"/>
+                </a:solidFill>
+                <a:effectLst/>
+                <a:latin typeface="+mn-lt"/>
+                <a:ea typeface="+mn-ea"/>
+                <a:cs typeface="+mn-cs"/>
+              </a:rPr>
+              <a:t>The initial proof of concept will start with providing a S2S VPN between the virtual network the Azure Web App is connected to and Azure Stack and another S2S Gateway between the Azure Stack Datacenter in FT and the Contoso Regional HQ. </a:t>
+            </a:r>
+          </a:p>
+          <a:p>
+            <a:r>
+              <a:rPr lang="en-US" sz="1200" kern="1200" dirty="0">
+                <a:solidFill>
+                  <a:schemeClr val="tx1"/>
+                </a:solidFill>
+                <a:effectLst/>
+                <a:latin typeface="+mn-lt"/>
+                <a:ea typeface="+mn-ea"/>
+                <a:cs typeface="+mn-cs"/>
+              </a:rPr>
+              <a:t>For the future, both S2S and ExpressRoute will be configured for routing using BGP ensuring the best connections possible and one set of configurations for routing.  FT will provide the Public ASN number for the routes from their datacenter network in Dallas.  FT will also configure the BGP connections between their datacenter and the new routers on-premises at the Contoso Dallas office. Contoso’s Public IP Space will be leveraged along with the addition of public IP Space from FT.</a:t>
+            </a:r>
+            <a:endParaRPr lang="en-US" dirty="0"/>
           </a:p>
         </p:txBody>
       </p:sp>
@@ -2344,7 +2402,7 @@
           <a:p>
             <a:fld id="{0998D5BB-B127-481F-BC0A-2F77C576BB34}" type="slidenum">
               <a:rPr lang="en-US" smtClean="0"/>
-              <a:t>27</a:t>
+              <a:t>26</a:t>
             </a:fld>
             <a:endParaRPr lang="en-US"/>
           </a:p>
@@ -2353,7 +2411,7 @@
     </p:spTree>
     <p:extLst>
       <p:ext uri="{BB962C8B-B14F-4D97-AF65-F5344CB8AC3E}">
-        <p14:creationId xmlns:p14="http://schemas.microsoft.com/office/powerpoint/2010/main" val="2317620794"/>
+        <p14:creationId xmlns:p14="http://schemas.microsoft.com/office/powerpoint/2010/main" val="3168858057"/>
       </p:ext>
     </p:extLst>
   </p:cSld>
@@ -2428,7 +2486,7 @@
           <a:p>
             <a:fld id="{0998D5BB-B127-481F-BC0A-2F77C576BB34}" type="slidenum">
               <a:rPr lang="en-US" smtClean="0"/>
-              <a:t>28</a:t>
+              <a:t>27</a:t>
             </a:fld>
             <a:endParaRPr lang="en-US"/>
           </a:p>
@@ -2437,7 +2495,7 @@
     </p:spTree>
     <p:extLst>
       <p:ext uri="{BB962C8B-B14F-4D97-AF65-F5344CB8AC3E}">
-        <p14:creationId xmlns:p14="http://schemas.microsoft.com/office/powerpoint/2010/main" val="2666464400"/>
+        <p14:creationId xmlns:p14="http://schemas.microsoft.com/office/powerpoint/2010/main" val="2317620794"/>
       </p:ext>
     </p:extLst>
   </p:cSld>
@@ -2512,7 +2570,7 @@
           <a:p>
             <a:fld id="{0998D5BB-B127-481F-BC0A-2F77C576BB34}" type="slidenum">
               <a:rPr lang="en-US" smtClean="0"/>
-              <a:t>29</a:t>
+              <a:t>28</a:t>
             </a:fld>
             <a:endParaRPr lang="en-US"/>
           </a:p>
@@ -2521,7 +2579,7 @@
     </p:spTree>
     <p:extLst>
       <p:ext uri="{BB962C8B-B14F-4D97-AF65-F5344CB8AC3E}">
-        <p14:creationId xmlns:p14="http://schemas.microsoft.com/office/powerpoint/2010/main" val="552729278"/>
+        <p14:creationId xmlns:p14="http://schemas.microsoft.com/office/powerpoint/2010/main" val="2666464400"/>
       </p:ext>
     </p:extLst>
   </p:cSld>
@@ -2596,7 +2654,7 @@
           <a:p>
             <a:fld id="{0998D5BB-B127-481F-BC0A-2F77C576BB34}" type="slidenum">
               <a:rPr lang="en-US" smtClean="0"/>
-              <a:t>30</a:t>
+              <a:t>29</a:t>
             </a:fld>
             <a:endParaRPr lang="en-US"/>
           </a:p>
@@ -2605,7 +2663,7 @@
     </p:spTree>
     <p:extLst>
       <p:ext uri="{BB962C8B-B14F-4D97-AF65-F5344CB8AC3E}">
-        <p14:creationId xmlns:p14="http://schemas.microsoft.com/office/powerpoint/2010/main" val="1286020422"/>
+        <p14:creationId xmlns:p14="http://schemas.microsoft.com/office/powerpoint/2010/main" val="552729278"/>
       </p:ext>
     </p:extLst>
   </p:cSld>
@@ -2682,7 +2740,7 @@
               <a:rPr lang="en-US" smtClean="0"/>
               <a:t>3</a:t>
             </a:fld>
-            <a:endParaRPr lang="en-US" dirty="0"/>
+            <a:endParaRPr lang="en-US"/>
           </a:p>
         </p:txBody>
       </p:sp>
@@ -2764,7 +2822,7 @@
           <a:p>
             <a:fld id="{0998D5BB-B127-481F-BC0A-2F77C576BB34}" type="slidenum">
               <a:rPr lang="en-US" smtClean="0"/>
-              <a:t>31</a:t>
+              <a:t>30</a:t>
             </a:fld>
             <a:endParaRPr lang="en-US"/>
           </a:p>
@@ -2773,7 +2831,7 @@
     </p:spTree>
     <p:extLst>
       <p:ext uri="{BB962C8B-B14F-4D97-AF65-F5344CB8AC3E}">
-        <p14:creationId xmlns:p14="http://schemas.microsoft.com/office/powerpoint/2010/main" val="930945961"/>
+        <p14:creationId xmlns:p14="http://schemas.microsoft.com/office/powerpoint/2010/main" val="1286020422"/>
       </p:ext>
     </p:extLst>
   </p:cSld>
@@ -2848,6 +2906,90 @@
           <a:p>
             <a:fld id="{0998D5BB-B127-481F-BC0A-2F77C576BB34}" type="slidenum">
               <a:rPr lang="en-US" smtClean="0"/>
+              <a:t>31</a:t>
+            </a:fld>
+            <a:endParaRPr lang="en-US"/>
+          </a:p>
+        </p:txBody>
+      </p:sp>
+    </p:spTree>
+    <p:extLst>
+      <p:ext uri="{BB962C8B-B14F-4D97-AF65-F5344CB8AC3E}">
+        <p14:creationId xmlns:p14="http://schemas.microsoft.com/office/powerpoint/2010/main" val="930945961"/>
+      </p:ext>
+    </p:extLst>
+  </p:cSld>
+  <p:clrMapOvr>
+    <a:masterClrMapping/>
+  </p:clrMapOvr>
+</p:notes>
+</file>
+
+<file path=ppt/notesSlides/notesSlide32.xml><?xml version="1.0" encoding="utf-8"?>
+<p:notes xmlns:a="http://schemas.openxmlformats.org/drawingml/2006/main" xmlns:r="http://schemas.openxmlformats.org/officeDocument/2006/relationships" xmlns:p="http://schemas.openxmlformats.org/presentationml/2006/main">
+  <p:cSld>
+    <p:spTree>
+      <p:nvGrpSpPr>
+        <p:cNvPr id="1" name=""/>
+        <p:cNvGrpSpPr/>
+        <p:nvPr/>
+      </p:nvGrpSpPr>
+      <p:grpSpPr>
+        <a:xfrm>
+          <a:off x="0" y="0"/>
+          <a:ext cx="0" cy="0"/>
+          <a:chOff x="0" y="0"/>
+          <a:chExt cx="0" cy="0"/>
+        </a:xfrm>
+      </p:grpSpPr>
+      <p:sp>
+        <p:nvSpPr>
+          <p:cNvPr id="2" name="Slide Image Placeholder 1"/>
+          <p:cNvSpPr>
+            <a:spLocks noGrp="1" noRot="1" noChangeAspect="1"/>
+          </p:cNvSpPr>
+          <p:nvPr>
+            <p:ph type="sldImg"/>
+          </p:nvPr>
+        </p:nvSpPr>
+        <p:spPr/>
+      </p:sp>
+      <p:sp>
+        <p:nvSpPr>
+          <p:cNvPr id="3" name="Notes Placeholder 2"/>
+          <p:cNvSpPr>
+            <a:spLocks noGrp="1"/>
+          </p:cNvSpPr>
+          <p:nvPr>
+            <p:ph type="body" idx="1"/>
+          </p:nvPr>
+        </p:nvSpPr>
+        <p:spPr/>
+        <p:txBody>
+          <a:bodyPr/>
+          <a:lstStyle/>
+          <a:p>
+            <a:endParaRPr lang="en-US"/>
+          </a:p>
+        </p:txBody>
+      </p:sp>
+      <p:sp>
+        <p:nvSpPr>
+          <p:cNvPr id="4" name="Slide Number Placeholder 3"/>
+          <p:cNvSpPr>
+            <a:spLocks noGrp="1"/>
+          </p:cNvSpPr>
+          <p:nvPr>
+            <p:ph type="sldNum" sz="quarter" idx="10"/>
+          </p:nvPr>
+        </p:nvSpPr>
+        <p:spPr/>
+        <p:txBody>
+          <a:bodyPr/>
+          <a:lstStyle/>
+          <a:p>
+            <a:fld id="{0998D5BB-B127-481F-BC0A-2F77C576BB34}" type="slidenum">
+              <a:rPr lang="en-US" smtClean="0"/>
               <a:t>32</a:t>
             </a:fld>
             <a:endParaRPr lang="en-US"/>
@@ -2867,7 +3009,7 @@
 </p:notes>
 </file>
 
-<file path=ppt/notesSlides/notesSlide32.xml><?xml version="1.0" encoding="utf-8"?>
+<file path=ppt/notesSlides/notesSlide33.xml><?xml version="1.0" encoding="utf-8"?>
 <p:notes xmlns:a="http://schemas.openxmlformats.org/drawingml/2006/main" xmlns:r="http://schemas.openxmlformats.org/officeDocument/2006/relationships" xmlns:p="http://schemas.openxmlformats.org/presentationml/2006/main">
   <p:cSld>
     <p:spTree>
@@ -2974,7 +3116,7 @@
                   <a:prstClr val="black"/>
                 </a:solidFill>
               </a:rPr>
-              <a:t>5/24/2018 4:56 AM</a:t>
+              <a:t>6/7/2018 11:33 AM</a:t>
             </a:fld>
             <a:endParaRPr lang="en-US" dirty="0">
               <a:solidFill>
@@ -3012,6 +3154,60 @@
               <a:solidFill>
                 <a:prstClr val="black"/>
               </a:solidFill>
+            </a:endParaRPr>
+          </a:p>
+        </p:txBody>
+      </p:sp>
+      <p:sp>
+        <p:nvSpPr>
+          <p:cNvPr id="6" name="Footer Placeholder 5"/>
+          <p:cNvSpPr>
+            <a:spLocks noGrp="1"/>
+          </p:cNvSpPr>
+          <p:nvPr>
+            <p:ph type="ftr" sz="quarter" idx="14"/>
+          </p:nvPr>
+        </p:nvSpPr>
+        <p:spPr/>
+        <p:txBody>
+          <a:bodyPr/>
+          <a:lstStyle/>
+          <a:p>
+            <a:pPr defTabSz="914099" eaLnBrk="0" hangingPunct="0"/>
+            <a:r>
+              <a:rPr lang="en-US" sz="400">
+                <a:gradFill>
+                  <a:gsLst>
+                    <a:gs pos="0">
+                      <a:prstClr val="black"/>
+                    </a:gs>
+                    <a:gs pos="100000">
+                      <a:prstClr val="black"/>
+                    </a:gs>
+                  </a:gsLst>
+                  <a:lin ang="5400000" scaled="0"/>
+                </a:gradFill>
+                <a:latin typeface="Segoe UI" pitchFamily="34" charset="0"/>
+                <a:ea typeface="Segoe UI" pitchFamily="34" charset="0"/>
+                <a:cs typeface="Segoe UI" pitchFamily="34" charset="0"/>
+              </a:rPr>
+              <a:t>© Microsoft Corporation. All rights reserved. MICROSOFT MAKES NO WARRANTIES, EXPRESS, IMPLIED OR STATUTORY, AS TO THE INFORMATION IN THIS PRESENTATION.</a:t>
+            </a:r>
+            <a:endParaRPr lang="en-US" sz="400" dirty="0">
+              <a:gradFill>
+                <a:gsLst>
+                  <a:gs pos="0">
+                    <a:prstClr val="black"/>
+                  </a:gs>
+                  <a:gs pos="100000">
+                    <a:prstClr val="black"/>
+                  </a:gs>
+                </a:gsLst>
+                <a:lin ang="5400000" scaled="0"/>
+              </a:gradFill>
+              <a:latin typeface="Segoe UI" pitchFamily="34" charset="0"/>
+              <a:ea typeface="Segoe UI" pitchFamily="34" charset="0"/>
+              <a:cs typeface="Segoe UI" pitchFamily="34" charset="0"/>
             </a:endParaRPr>
           </a:p>
         </p:txBody>
@@ -3073,7 +3269,7 @@
           <a:bodyPr/>
           <a:lstStyle/>
           <a:p>
-            <a:endParaRPr lang="en-US" dirty="0"/>
+            <a:endParaRPr lang="en-US"/>
           </a:p>
         </p:txBody>
       </p:sp>
@@ -3096,7 +3292,7 @@
               <a:rPr lang="en-US" smtClean="0"/>
               <a:t>4</a:t>
             </a:fld>
-            <a:endParaRPr lang="en-US" dirty="0"/>
+            <a:endParaRPr lang="en-US"/>
           </a:p>
         </p:txBody>
       </p:sp>
@@ -3157,7 +3353,7 @@
           <a:bodyPr/>
           <a:lstStyle/>
           <a:p>
-            <a:endParaRPr lang="en-US" dirty="0"/>
+            <a:endParaRPr lang="en-US"/>
           </a:p>
         </p:txBody>
       </p:sp>
@@ -3180,7 +3376,7 @@
               <a:rPr lang="en-US" smtClean="0"/>
               <a:t>5</a:t>
             </a:fld>
-            <a:endParaRPr lang="en-US" dirty="0"/>
+            <a:endParaRPr lang="en-US"/>
           </a:p>
         </p:txBody>
       </p:sp>
@@ -3241,7 +3437,7 @@
           <a:bodyPr/>
           <a:lstStyle/>
           <a:p>
-            <a:endParaRPr lang="en-US" dirty="0"/>
+            <a:endParaRPr lang="en-US"/>
           </a:p>
         </p:txBody>
       </p:sp>
@@ -3264,7 +3460,7 @@
               <a:rPr lang="en-US" smtClean="0"/>
               <a:t>6</a:t>
             </a:fld>
-            <a:endParaRPr lang="en-US" dirty="0"/>
+            <a:endParaRPr lang="en-US"/>
           </a:p>
         </p:txBody>
       </p:sp>
@@ -3325,7 +3521,7 @@
           <a:bodyPr/>
           <a:lstStyle/>
           <a:p>
-            <a:endParaRPr lang="en-US" dirty="0"/>
+            <a:endParaRPr lang="en-US"/>
           </a:p>
         </p:txBody>
       </p:sp>
@@ -3348,7 +3544,7 @@
               <a:rPr lang="en-US" smtClean="0"/>
               <a:t>7</a:t>
             </a:fld>
-            <a:endParaRPr lang="en-US" dirty="0"/>
+            <a:endParaRPr lang="en-US"/>
           </a:p>
         </p:txBody>
       </p:sp>
@@ -3409,7 +3605,7 @@
           <a:bodyPr/>
           <a:lstStyle/>
           <a:p>
-            <a:endParaRPr lang="en-US"/>
+            <a:endParaRPr lang="en-US" dirty="0"/>
           </a:p>
         </p:txBody>
       </p:sp>
@@ -3430,7 +3626,7 @@
           <a:p>
             <a:fld id="{0998D5BB-B127-481F-BC0A-2F77C576BB34}" type="slidenum">
               <a:rPr lang="en-US" smtClean="0"/>
-              <a:t>9</a:t>
+              <a:t>8</a:t>
             </a:fld>
             <a:endParaRPr lang="en-US"/>
           </a:p>
@@ -3439,7 +3635,7 @@
     </p:spTree>
     <p:extLst>
       <p:ext uri="{BB962C8B-B14F-4D97-AF65-F5344CB8AC3E}">
-        <p14:creationId xmlns:p14="http://schemas.microsoft.com/office/powerpoint/2010/main" val="3403332790"/>
+        <p14:creationId xmlns:p14="http://schemas.microsoft.com/office/powerpoint/2010/main" val="1548624346"/>
       </p:ext>
     </p:extLst>
   </p:cSld>
@@ -3514,7 +3710,7 @@
           <a:p>
             <a:fld id="{0998D5BB-B127-481F-BC0A-2F77C576BB34}" type="slidenum">
               <a:rPr lang="en-US" smtClean="0"/>
-              <a:t>10</a:t>
+              <a:t>9</a:t>
             </a:fld>
             <a:endParaRPr lang="en-US"/>
           </a:p>
@@ -3523,7 +3719,7 @@
     </p:spTree>
     <p:extLst>
       <p:ext uri="{BB962C8B-B14F-4D97-AF65-F5344CB8AC3E}">
-        <p14:creationId xmlns:p14="http://schemas.microsoft.com/office/powerpoint/2010/main" val="2356007107"/>
+        <p14:creationId xmlns:p14="http://schemas.microsoft.com/office/powerpoint/2010/main" val="3403332790"/>
       </p:ext>
     </p:extLst>
   </p:cSld>
@@ -3670,7 +3866,7 @@
           <a:lstStyle/>
           <a:p>
             <a:r>
-              <a:rPr dirty="0">
+              <a:rPr>
                 <a:gradFill>
                   <a:gsLst>
                     <a:gs pos="2239">
@@ -12827,6 +13023,61 @@
           </p:txBody>
         </p:sp>
       </p:grpSp>
+      <p:sp>
+        <p:nvSpPr>
+          <p:cNvPr id="8" name="Text Box 3"/>
+          <p:cNvSpPr txBox="1">
+            <a:spLocks noChangeArrowheads="1"/>
+          </p:cNvSpPr>
+          <p:nvPr userDrawn="1"/>
+        </p:nvSpPr>
+        <p:spPr bwMode="blackWhite">
+          <a:xfrm>
+            <a:off x="269240" y="6099190"/>
+            <a:ext cx="4482124" cy="467742"/>
+          </a:xfrm>
+          <a:prstGeom prst="rect">
+            <a:avLst/>
+          </a:prstGeom>
+          <a:noFill/>
+          <a:ln w="12700">
+            <a:noFill/>
+            <a:miter lim="800000"/>
+            <a:headEnd type="none" w="sm" len="sm"/>
+            <a:tailEnd type="none" w="sm" len="sm"/>
+          </a:ln>
+          <a:effectLst/>
+        </p:spPr>
+        <p:txBody>
+          <a:bodyPr vert="horz" wrap="square" lIns="179285" tIns="179285" rIns="179285" bIns="179285" numCol="1" anchor="t" anchorCtr="0" compatLnSpc="1">
+            <a:prstTxWarp prst="textNoShape">
+              <a:avLst/>
+            </a:prstTxWarp>
+            <a:spAutoFit/>
+          </a:bodyPr>
+          <a:lstStyle/>
+          <a:p>
+            <a:pPr defTabSz="913924" eaLnBrk="0" hangingPunct="0"/>
+            <a:r>
+              <a:rPr lang="en-US" sz="686" dirty="0">
+                <a:gradFill>
+                  <a:gsLst>
+                    <a:gs pos="0">
+                      <a:schemeClr val="tx1"/>
+                    </a:gs>
+                    <a:gs pos="100000">
+                      <a:schemeClr val="tx1"/>
+                    </a:gs>
+                  </a:gsLst>
+                  <a:lin ang="5400000" scaled="0"/>
+                </a:gradFill>
+                <a:cs typeface="Segoe UI" pitchFamily="34" charset="0"/>
+              </a:rPr>
+              <a:t>© Copyright Microsoft Corporation. All rights reserved. </a:t>
+            </a:r>
+          </a:p>
+        </p:txBody>
+      </p:sp>
     </p:spTree>
     <p:extLst>
       <p:ext uri="{BB962C8B-B14F-4D97-AF65-F5344CB8AC3E}">
@@ -14270,7 +14521,7 @@
           </a:lstStyle>
           <a:p>
             <a:r>
-              <a:rPr dirty="0">
+              <a:rPr>
                 <a:gradFill>
                   <a:gsLst>
                     <a:gs pos="2239">
@@ -16496,7 +16747,7 @@
       </p:sp>
       <p:pic>
         <p:nvPicPr>
-          <p:cNvPr id="6" name="Picture 5" descr="In the Infographic for Common scenarios, Microsoft Azure (public) is connected to the Microsoft Azure Stoack (private / hosted) through Developers and IT." title="Infographic for Common scenarios ">
+          <p:cNvPr id="6" name="Picture 5">
             <a:extLst>
               <a:ext uri="{FF2B5EF4-FFF2-40B4-BE49-F238E27FC236}">
                 <a16:creationId xmlns:a16="http://schemas.microsoft.com/office/drawing/2014/main" id="{6C14C21A-C3BB-49F2-9B3E-E7E07FD9E42F}"/>
@@ -18238,7 +18489,7 @@
       </p:sp>
       <p:pic>
         <p:nvPicPr>
-          <p:cNvPr id="7" name="Picture 6" descr="Both Traffic manager and VPN connect Azure Public (South Central) with the Azure Stock FusionTomo Dallas Datacenter, which in turn connects via VPN to On-Premises." title="Preferred solution">
+          <p:cNvPr id="7" name="Picture 6">
             <a:extLst>
               <a:ext uri="{FF2B5EF4-FFF2-40B4-BE49-F238E27FC236}">
                 <a16:creationId xmlns:a16="http://schemas.microsoft.com/office/drawing/2014/main" id="{9A116A74-914E-40CA-BE1D-2A3A13F7C6B9}"/>
@@ -18899,13 +19150,8 @@
             </a:pPr>
             <a:r>
               <a:rPr lang="en-US" sz="2800" dirty="0"/>
-              <a:t>Can expand to other tenants for </a:t>
-            </a:r>
-            <a:r>
-              <a:rPr lang="en-US" sz="2800"/>
-              <a:t>other countries/regions</a:t>
-            </a:r>
-            <a:endParaRPr lang="en-US" sz="2800" dirty="0"/>
+              <a:t>Can expand to other tenants for other countries in the region</a:t>
+            </a:r>
           </a:p>
           <a:p>
             <a:pPr marL="0" indent="0">
@@ -19814,7 +20060,9 @@
           </a:xfrm>
         </p:spPr>
         <p:txBody>
-          <a:bodyPr/>
+          <a:bodyPr vert="horz" wrap="square" lIns="146304" tIns="91440" rIns="146304" bIns="91440" rtlCol="0" anchor="t">
+            <a:spAutoFit/>
+          </a:bodyPr>
           <a:lstStyle/>
           <a:p>
             <a:pPr marL="0" indent="0">
@@ -19841,18 +20089,24 @@
             </a:r>
           </a:p>
           <a:p>
-            <a:pPr lvl="1"/>
+            <a:pPr marL="572135" lvl="1" indent="-236220"/>
             <a:r>
               <a:rPr lang="en-US" sz="2800" dirty="0"/>
               <a:t>The SQL Server RP will installed and made available.</a:t>
             </a:r>
-          </a:p>
-          <a:p>
-            <a:pPr lvl="1"/>
+            <a:endParaRPr lang="en-US" sz="2800" dirty="0">
+              <a:cs typeface="Segoe UI Semilight"/>
+            </a:endParaRPr>
+          </a:p>
+          <a:p>
+            <a:pPr marL="572135" lvl="1" indent="-236220"/>
             <a:r>
               <a:rPr lang="en-US" sz="2800" dirty="0"/>
               <a:t>The Azure App Service RP will installed and made available.</a:t>
             </a:r>
+            <a:endParaRPr lang="en-US" sz="2800" dirty="0">
+              <a:cs typeface="Segoe UI Semilight"/>
+            </a:endParaRPr>
           </a:p>
           <a:p>
             <a:pPr lvl="1"/>
@@ -20229,7 +20483,7 @@
       </p:sp>
       <p:pic>
         <p:nvPicPr>
-          <p:cNvPr id="6" name="Picture 5" descr="The Azure Stack Taxonomy has Region, Tenant, Subscription, Offer, Plan, and Services." title="Azure Stack taxonomy">
+          <p:cNvPr id="6" name="Picture 5">
             <a:extLst>
               <a:ext uri="{FF2B5EF4-FFF2-40B4-BE49-F238E27FC236}">
                 <a16:creationId xmlns:a16="http://schemas.microsoft.com/office/drawing/2014/main" id="{A5FAFEA0-0A2A-4C09-B865-9838C38C0F50}"/>
@@ -20390,100 +20644,79 @@
           </a:p>
         </p:txBody>
       </p:sp>
-      <p:grpSp>
-        <p:nvGrpSpPr>
-          <p:cNvPr id="4" name="Group 3" descr="Product icons" title="Product icons">
+      <p:pic>
+        <p:nvPicPr>
+          <p:cNvPr id="5" name="Picture 4">
             <a:extLst>
               <a:ext uri="{FF2B5EF4-FFF2-40B4-BE49-F238E27FC236}">
-                <a16:creationId xmlns:a16="http://schemas.microsoft.com/office/drawing/2014/main" id="{F52860B9-6B4D-4AC6-BC8D-930AC81FC3A7}"/>
+                <a16:creationId xmlns:a16="http://schemas.microsoft.com/office/drawing/2014/main" id="{91898400-8E09-4BC6-B908-5D552E09DE7C}"/>
               </a:ext>
             </a:extLst>
           </p:cNvPr>
-          <p:cNvGrpSpPr/>
+          <p:cNvPicPr>
+            <a:picLocks noChangeAspect="1"/>
+          </p:cNvPicPr>
           <p:nvPr/>
-        </p:nvGrpSpPr>
-        <p:grpSpPr>
+        </p:nvPicPr>
+        <p:blipFill>
+          <a:blip r:embed="rId3" cstate="print">
+            <a:extLst>
+              <a:ext uri="{28A0092B-C50C-407E-A947-70E740481C1C}">
+                <a14:useLocalDpi xmlns:a14="http://schemas.microsoft.com/office/drawing/2010/main" val="0"/>
+              </a:ext>
+            </a:extLst>
+          </a:blip>
+          <a:stretch>
+            <a:fillRect/>
+          </a:stretch>
+        </p:blipFill>
+        <p:spPr>
           <a:xfrm>
-            <a:off x="9025525" y="1184706"/>
-            <a:ext cx="2083508" cy="4327801"/>
-            <a:chOff x="9025525" y="1184706"/>
-            <a:chExt cx="2083508" cy="4327801"/>
+            <a:off x="9025525" y="3429000"/>
+            <a:ext cx="2083507" cy="2083507"/>
           </a:xfrm>
-        </p:grpSpPr>
-        <p:pic>
-          <p:nvPicPr>
-            <p:cNvPr id="5" name="Picture 4" descr="Visual Studio code icon" title="Visual Studio code icon">
-              <a:extLst>
-                <a:ext uri="{FF2B5EF4-FFF2-40B4-BE49-F238E27FC236}">
-                  <a16:creationId xmlns:a16="http://schemas.microsoft.com/office/drawing/2014/main" id="{91898400-8E09-4BC6-B908-5D552E09DE7C}"/>
-                </a:ext>
-              </a:extLst>
-            </p:cNvPr>
-            <p:cNvPicPr>
-              <a:picLocks noChangeAspect="1"/>
-            </p:cNvPicPr>
-            <p:nvPr/>
-          </p:nvPicPr>
-          <p:blipFill>
-            <a:blip r:embed="rId3" cstate="print">
-              <a:extLst>
-                <a:ext uri="{28A0092B-C50C-407E-A947-70E740481C1C}">
-                  <a14:useLocalDpi xmlns:a14="http://schemas.microsoft.com/office/drawing/2010/main" val="0"/>
-                </a:ext>
-              </a:extLst>
-            </a:blip>
-            <a:stretch>
-              <a:fillRect/>
-            </a:stretch>
-          </p:blipFill>
-          <p:spPr>
-            <a:xfrm>
-              <a:off x="9025525" y="3429000"/>
-              <a:ext cx="2083507" cy="2083507"/>
-            </a:xfrm>
-            <a:prstGeom prst="rect">
-              <a:avLst/>
-            </a:prstGeom>
-          </p:spPr>
-        </p:pic>
-        <p:pic>
-          <p:nvPicPr>
-            <p:cNvPr id="7" name="Picture 6" descr="ARM template icon" title="ARM template icon">
-              <a:extLst>
-                <a:ext uri="{FF2B5EF4-FFF2-40B4-BE49-F238E27FC236}">
-                  <a16:creationId xmlns:a16="http://schemas.microsoft.com/office/drawing/2014/main" id="{8C541AF4-D001-426F-81D4-C8594B9F4DDA}"/>
-                </a:ext>
-              </a:extLst>
-            </p:cNvPr>
-            <p:cNvPicPr>
-              <a:picLocks noChangeAspect="1"/>
-            </p:cNvPicPr>
-            <p:nvPr/>
-          </p:nvPicPr>
-          <p:blipFill>
-            <a:blip r:embed="rId4" cstate="print">
-              <a:biLevel thresh="25000"/>
-              <a:extLst>
-                <a:ext uri="{28A0092B-C50C-407E-A947-70E740481C1C}">
-                  <a14:useLocalDpi xmlns:a14="http://schemas.microsoft.com/office/drawing/2010/main" val="0"/>
-                </a:ext>
-              </a:extLst>
-            </a:blip>
-            <a:stretch>
-              <a:fillRect/>
-            </a:stretch>
-          </p:blipFill>
-          <p:spPr>
-            <a:xfrm>
-              <a:off x="9025526" y="1184706"/>
-              <a:ext cx="2083507" cy="2083507"/>
-            </a:xfrm>
-            <a:prstGeom prst="rect">
-              <a:avLst/>
-            </a:prstGeom>
-          </p:spPr>
-        </p:pic>
-      </p:grpSp>
+          <a:prstGeom prst="rect">
+            <a:avLst/>
+          </a:prstGeom>
+        </p:spPr>
+      </p:pic>
+      <p:pic>
+        <p:nvPicPr>
+          <p:cNvPr id="7" name="Picture 6">
+            <a:extLst>
+              <a:ext uri="{FF2B5EF4-FFF2-40B4-BE49-F238E27FC236}">
+                <a16:creationId xmlns:a16="http://schemas.microsoft.com/office/drawing/2014/main" id="{8C541AF4-D001-426F-81D4-C8594B9F4DDA}"/>
+              </a:ext>
+            </a:extLst>
+          </p:cNvPr>
+          <p:cNvPicPr>
+            <a:picLocks noChangeAspect="1"/>
+          </p:cNvPicPr>
+          <p:nvPr/>
+        </p:nvPicPr>
+        <p:blipFill>
+          <a:blip r:embed="rId4" cstate="print">
+            <a:biLevel thresh="25000"/>
+            <a:extLst>
+              <a:ext uri="{28A0092B-C50C-407E-A947-70E740481C1C}">
+                <a14:useLocalDpi xmlns:a14="http://schemas.microsoft.com/office/drawing/2010/main" val="0"/>
+              </a:ext>
+            </a:extLst>
+          </a:blip>
+          <a:stretch>
+            <a:fillRect/>
+          </a:stretch>
+        </p:blipFill>
+        <p:spPr>
+          <a:xfrm>
+            <a:off x="9025526" y="1184706"/>
+            <a:ext cx="2083507" cy="2083507"/>
+          </a:xfrm>
+          <a:prstGeom prst="rect">
+            <a:avLst/>
+          </a:prstGeom>
+        </p:spPr>
+      </p:pic>
     </p:spTree>
     <p:extLst>
       <p:ext uri="{BB962C8B-B14F-4D97-AF65-F5344CB8AC3E}">
@@ -23376,10 +23609,10 @@
       </p:grpSpPr>
       <p:sp>
         <p:nvSpPr>
-          <p:cNvPr id="2" name="Title 1">
+          <p:cNvPr id="3" name="Title 2">
             <a:extLst>
               <a:ext uri="{FF2B5EF4-FFF2-40B4-BE49-F238E27FC236}">
-                <a16:creationId xmlns:a16="http://schemas.microsoft.com/office/drawing/2014/main" id="{5EE480FB-7F45-4B29-A66F-28D081D25198}"/>
+                <a16:creationId xmlns:a16="http://schemas.microsoft.com/office/drawing/2014/main" id="{BA1A82DC-2529-4862-82F8-452F2E8F9E33}"/>
               </a:ext>
             </a:extLst>
           </p:cNvPr>
@@ -23396,768 +23629,58 @@
           <a:lstStyle/>
           <a:p>
             <a:r>
-              <a:rPr lang="en-US" sz="4400" dirty="0">
+              <a:rPr lang="en-US" sz="4800" dirty="0">
                 <a:solidFill>
                   <a:schemeClr val="tx1"/>
                 </a:solidFill>
               </a:rPr>
               <a:t>Customer situation</a:t>
             </a:r>
+            <a:br>
+              <a:rPr lang="en-US" dirty="0">
+                <a:solidFill>
+                  <a:schemeClr val="tx1"/>
+                </a:solidFill>
+                <a:latin typeface="Segoe UI" panose="020B0502040204020203" pitchFamily="34" charset="0"/>
+              </a:rPr>
+            </a:br>
             <a:endParaRPr lang="en-US" dirty="0"/>
           </a:p>
         </p:txBody>
       </p:sp>
-      <p:grpSp>
-        <p:nvGrpSpPr>
-          <p:cNvPr id="37" name="Group 36" descr="The Contoso Dallas Data Center diagram shows the flow between Contoso Mortgage customers and Contoso's web servers, application servers, and SQL servers." title="general description for me">
+      <p:pic>
+        <p:nvPicPr>
+          <p:cNvPr id="6" name="Picture 5" descr="Diagram indicating the customer situation. Shows how data from Contoso mortgage customers moves from public facing web servers to a queue and from there move to application servers and SQL (sequel) servers.">
             <a:extLst>
               <a:ext uri="{FF2B5EF4-FFF2-40B4-BE49-F238E27FC236}">
-                <a16:creationId xmlns:a16="http://schemas.microsoft.com/office/drawing/2014/main" id="{057BF08D-7F1D-468F-82D6-A05D7733A48B}"/>
+                <a16:creationId xmlns:a16="http://schemas.microsoft.com/office/drawing/2014/main" id="{5A395316-1127-4EA2-BC4A-8775A66C7EC1}"/>
               </a:ext>
             </a:extLst>
           </p:cNvPr>
-          <p:cNvGrpSpPr/>
+          <p:cNvPicPr>
+            <a:picLocks noChangeAspect="1"/>
+          </p:cNvPicPr>
           <p:nvPr/>
-        </p:nvGrpSpPr>
-        <p:grpSpPr>
+        </p:nvPicPr>
+        <p:blipFill rotWithShape="1">
+          <a:blip r:embed="rId3"/>
+          <a:srcRect l="1442" r="2955"/>
+          <a:stretch/>
+        </p:blipFill>
+        <p:spPr>
           <a:xfrm>
-            <a:off x="1785433" y="1878081"/>
-            <a:ext cx="9329280" cy="4427587"/>
-            <a:chOff x="1785433" y="1878081"/>
-            <a:chExt cx="9329280" cy="4427587"/>
+            <a:off x="268080" y="1189176"/>
+            <a:ext cx="11655840" cy="4974897"/>
           </a:xfrm>
-        </p:grpSpPr>
-        <p:sp>
-          <p:nvSpPr>
-            <p:cNvPr id="23" name="Rectangle 22">
-              <a:extLst>
-                <a:ext uri="{FF2B5EF4-FFF2-40B4-BE49-F238E27FC236}">
-                  <a16:creationId xmlns:a16="http://schemas.microsoft.com/office/drawing/2014/main" id="{7482353B-0903-4FCC-BC8F-BE4552BFE37A}"/>
-                </a:ext>
-              </a:extLst>
-            </p:cNvPr>
-            <p:cNvSpPr/>
-            <p:nvPr/>
-          </p:nvSpPr>
-          <p:spPr bwMode="auto">
-            <a:xfrm>
-              <a:off x="3838289" y="1878081"/>
-              <a:ext cx="6937394" cy="3482384"/>
-            </a:xfrm>
-            <a:prstGeom prst="rect">
-              <a:avLst/>
-            </a:prstGeom>
-            <a:noFill/>
-            <a:ln w="38100">
-              <a:solidFill>
-                <a:schemeClr val="bg1"/>
-              </a:solidFill>
-              <a:headEnd type="none" w="med" len="med"/>
-              <a:tailEnd type="none" w="med" len="med"/>
-            </a:ln>
-            <a:effectLst/>
-          </p:spPr>
-          <p:style>
-            <a:lnRef idx="1">
-              <a:schemeClr val="accent2"/>
-            </a:lnRef>
-            <a:fillRef idx="3">
-              <a:schemeClr val="accent2"/>
-            </a:fillRef>
-            <a:effectRef idx="2">
-              <a:schemeClr val="accent2"/>
-            </a:effectRef>
-            <a:fontRef idx="minor">
-              <a:schemeClr val="lt1"/>
-            </a:fontRef>
-          </p:style>
-          <p:txBody>
-            <a:bodyPr rot="0" spcFirstLastPara="0" vertOverflow="overflow" horzOverflow="overflow" vert="horz" wrap="square" lIns="182880" tIns="146304" rIns="182880" bIns="146304" numCol="1" spcCol="0" rtlCol="0" fromWordArt="0" anchor="t" anchorCtr="0" forceAA="0" compatLnSpc="1">
-              <a:prstTxWarp prst="textNoShape">
-                <a:avLst/>
-              </a:prstTxWarp>
-              <a:noAutofit/>
-            </a:bodyPr>
-            <a:lstStyle/>
-            <a:p>
-              <a:pPr algn="ctr" defTabSz="932472" fontAlgn="base">
-                <a:lnSpc>
-                  <a:spcPct val="90000"/>
-                </a:lnSpc>
-                <a:spcBef>
-                  <a:spcPct val="0"/>
-                </a:spcBef>
-                <a:spcAft>
-                  <a:spcPct val="0"/>
-                </a:spcAft>
-              </a:pPr>
-              <a:endParaRPr lang="en-US" sz="2400" dirty="0">
-                <a:gradFill>
-                  <a:gsLst>
-                    <a:gs pos="0">
-                      <a:srgbClr val="FFFFFF"/>
-                    </a:gs>
-                    <a:gs pos="100000">
-                      <a:srgbClr val="FFFFFF"/>
-                    </a:gs>
-                  </a:gsLst>
-                  <a:lin ang="5400000" scaled="0"/>
-                </a:gradFill>
-                <a:ea typeface="Segoe UI" pitchFamily="34" charset="0"/>
-                <a:cs typeface="Segoe UI" pitchFamily="34" charset="0"/>
-              </a:endParaRPr>
-            </a:p>
-          </p:txBody>
-        </p:sp>
-        <p:pic>
-          <p:nvPicPr>
-            <p:cNvPr id="4" name="Picture 3">
-              <a:extLst>
-                <a:ext uri="{FF2B5EF4-FFF2-40B4-BE49-F238E27FC236}">
-                  <a16:creationId xmlns:a16="http://schemas.microsoft.com/office/drawing/2014/main" id="{2B26C188-A45A-4603-BE84-59F11E2D69AC}"/>
-                </a:ext>
-              </a:extLst>
-            </p:cNvPr>
-            <p:cNvPicPr>
-              <a:picLocks noChangeAspect="1"/>
-            </p:cNvPicPr>
-            <p:nvPr/>
-          </p:nvPicPr>
-          <p:blipFill>
-            <a:blip r:embed="rId2" cstate="print">
-              <a:biLevel thresh="25000"/>
-              <a:extLst>
-                <a:ext uri="{28A0092B-C50C-407E-A947-70E740481C1C}">
-                  <a14:useLocalDpi xmlns:a14="http://schemas.microsoft.com/office/drawing/2010/main" val="0"/>
-                </a:ext>
-              </a:extLst>
-            </a:blip>
-            <a:stretch>
-              <a:fillRect/>
-            </a:stretch>
-          </p:blipFill>
-          <p:spPr>
-            <a:xfrm>
-              <a:off x="1785433" y="2385889"/>
-              <a:ext cx="780290" cy="780290"/>
-            </a:xfrm>
-            <a:prstGeom prst="rect">
-              <a:avLst/>
-            </a:prstGeom>
-          </p:spPr>
-        </p:pic>
-        <p:pic>
-          <p:nvPicPr>
-            <p:cNvPr id="6" name="Picture 5">
-              <a:extLst>
-                <a:ext uri="{FF2B5EF4-FFF2-40B4-BE49-F238E27FC236}">
-                  <a16:creationId xmlns:a16="http://schemas.microsoft.com/office/drawing/2014/main" id="{DB46615B-C9CC-4425-808B-B178A7D832DA}"/>
-                </a:ext>
-              </a:extLst>
-            </p:cNvPr>
-            <p:cNvPicPr>
-              <a:picLocks noChangeAspect="1"/>
-            </p:cNvPicPr>
-            <p:nvPr/>
-          </p:nvPicPr>
-          <p:blipFill>
-            <a:blip r:embed="rId2" cstate="print">
-              <a:biLevel thresh="25000"/>
-              <a:extLst>
-                <a:ext uri="{28A0092B-C50C-407E-A947-70E740481C1C}">
-                  <a14:useLocalDpi xmlns:a14="http://schemas.microsoft.com/office/drawing/2010/main" val="0"/>
-                </a:ext>
-              </a:extLst>
-            </a:blip>
-            <a:stretch>
-              <a:fillRect/>
-            </a:stretch>
-          </p:blipFill>
-          <p:spPr>
-            <a:xfrm>
-              <a:off x="1785433" y="4028523"/>
-              <a:ext cx="780290" cy="780290"/>
-            </a:xfrm>
-            <a:prstGeom prst="rect">
-              <a:avLst/>
-            </a:prstGeom>
-          </p:spPr>
-        </p:pic>
-        <p:pic>
-          <p:nvPicPr>
-            <p:cNvPr id="8" name="Picture 7">
-              <a:extLst>
-                <a:ext uri="{FF2B5EF4-FFF2-40B4-BE49-F238E27FC236}">
-                  <a16:creationId xmlns:a16="http://schemas.microsoft.com/office/drawing/2014/main" id="{C3387932-193B-41E3-8AC2-40DE5FE7EB80}"/>
-                </a:ext>
-              </a:extLst>
-            </p:cNvPr>
-            <p:cNvPicPr>
-              <a:picLocks noChangeAspect="1"/>
-            </p:cNvPicPr>
-            <p:nvPr/>
-          </p:nvPicPr>
-          <p:blipFill>
-            <a:blip r:embed="rId3" cstate="print">
-              <a:lum bright="70000" contrast="-70000"/>
-              <a:extLst>
-                <a:ext uri="{28A0092B-C50C-407E-A947-70E740481C1C}">
-                  <a14:useLocalDpi xmlns:a14="http://schemas.microsoft.com/office/drawing/2010/main" val="0"/>
-                </a:ext>
-              </a:extLst>
-            </a:blip>
-            <a:stretch>
-              <a:fillRect/>
-            </a:stretch>
-          </p:blipFill>
-          <p:spPr>
-            <a:xfrm>
-              <a:off x="4686033" y="3957342"/>
-              <a:ext cx="780290" cy="780290"/>
-            </a:xfrm>
-            <a:prstGeom prst="rect">
-              <a:avLst/>
-            </a:prstGeom>
-          </p:spPr>
-        </p:pic>
-        <p:pic>
-          <p:nvPicPr>
-            <p:cNvPr id="10" name="Picture 9">
-              <a:extLst>
-                <a:ext uri="{FF2B5EF4-FFF2-40B4-BE49-F238E27FC236}">
-                  <a16:creationId xmlns:a16="http://schemas.microsoft.com/office/drawing/2014/main" id="{CC7CFC79-0600-4ECD-85C5-EEC70B70AA2F}"/>
-                </a:ext>
-              </a:extLst>
-            </p:cNvPr>
-            <p:cNvPicPr>
-              <a:picLocks noChangeAspect="1"/>
-            </p:cNvPicPr>
-            <p:nvPr/>
-          </p:nvPicPr>
-          <p:blipFill>
-            <a:blip r:embed="rId3" cstate="print">
-              <a:lum bright="70000" contrast="-70000"/>
-              <a:extLst>
-                <a:ext uri="{28A0092B-C50C-407E-A947-70E740481C1C}">
-                  <a14:useLocalDpi xmlns:a14="http://schemas.microsoft.com/office/drawing/2010/main" val="0"/>
-                </a:ext>
-              </a:extLst>
-            </a:blip>
-            <a:stretch>
-              <a:fillRect/>
-            </a:stretch>
-          </p:blipFill>
-          <p:spPr>
-            <a:xfrm>
-              <a:off x="4686033" y="2656741"/>
-              <a:ext cx="780290" cy="780290"/>
-            </a:xfrm>
-            <a:prstGeom prst="rect">
-              <a:avLst/>
-            </a:prstGeom>
-          </p:spPr>
-        </p:pic>
-        <p:pic>
-          <p:nvPicPr>
-            <p:cNvPr id="12" name="Picture 11">
-              <a:extLst>
-                <a:ext uri="{FF2B5EF4-FFF2-40B4-BE49-F238E27FC236}">
-                  <a16:creationId xmlns:a16="http://schemas.microsoft.com/office/drawing/2014/main" id="{B294339A-3A23-42D5-88E7-48F8808EADB5}"/>
-                </a:ext>
-              </a:extLst>
-            </p:cNvPr>
-            <p:cNvPicPr>
-              <a:picLocks noChangeAspect="1"/>
-            </p:cNvPicPr>
-            <p:nvPr/>
-          </p:nvPicPr>
-          <p:blipFill>
-            <a:blip r:embed="rId4" cstate="print">
-              <a:lum bright="70000" contrast="-70000"/>
-              <a:extLst>
-                <a:ext uri="{28A0092B-C50C-407E-A947-70E740481C1C}">
-                  <a14:useLocalDpi xmlns:a14="http://schemas.microsoft.com/office/drawing/2010/main" val="0"/>
-                </a:ext>
-              </a:extLst>
-            </a:blip>
-            <a:stretch>
-              <a:fillRect/>
-            </a:stretch>
-          </p:blipFill>
-          <p:spPr>
-            <a:xfrm rot="16200000">
-              <a:off x="3674464" y="3303066"/>
-              <a:ext cx="780290" cy="780290"/>
-            </a:xfrm>
-            <a:prstGeom prst="rect">
-              <a:avLst/>
-            </a:prstGeom>
-          </p:spPr>
-        </p:pic>
-        <p:pic>
-          <p:nvPicPr>
-            <p:cNvPr id="14" name="Picture 13">
-              <a:extLst>
-                <a:ext uri="{FF2B5EF4-FFF2-40B4-BE49-F238E27FC236}">
-                  <a16:creationId xmlns:a16="http://schemas.microsoft.com/office/drawing/2014/main" id="{FA02C0EC-607B-43DD-8E7C-3C6572527273}"/>
-                </a:ext>
-              </a:extLst>
-            </p:cNvPr>
-            <p:cNvPicPr>
-              <a:picLocks noChangeAspect="1"/>
-            </p:cNvPicPr>
-            <p:nvPr/>
-          </p:nvPicPr>
-          <p:blipFill>
-            <a:blip r:embed="rId5" cstate="print">
-              <a:lum bright="70000" contrast="-70000"/>
-              <a:extLst>
-                <a:ext uri="{28A0092B-C50C-407E-A947-70E740481C1C}">
-                  <a14:useLocalDpi xmlns:a14="http://schemas.microsoft.com/office/drawing/2010/main" val="0"/>
-                </a:ext>
-              </a:extLst>
-            </a:blip>
-            <a:stretch>
-              <a:fillRect/>
-            </a:stretch>
-          </p:blipFill>
-          <p:spPr>
-            <a:xfrm>
-              <a:off x="5605036" y="3303065"/>
-              <a:ext cx="780290" cy="780290"/>
-            </a:xfrm>
-            <a:prstGeom prst="rect">
-              <a:avLst/>
-            </a:prstGeom>
-          </p:spPr>
-        </p:pic>
-        <p:pic>
-          <p:nvPicPr>
-            <p:cNvPr id="16" name="Picture 15">
-              <a:extLst>
-                <a:ext uri="{FF2B5EF4-FFF2-40B4-BE49-F238E27FC236}">
-                  <a16:creationId xmlns:a16="http://schemas.microsoft.com/office/drawing/2014/main" id="{C513D7E1-A1C2-44CB-BC59-2F71B653F224}"/>
-                </a:ext>
-              </a:extLst>
-            </p:cNvPr>
-            <p:cNvPicPr>
-              <a:picLocks noChangeAspect="1"/>
-            </p:cNvPicPr>
-            <p:nvPr/>
-          </p:nvPicPr>
-          <p:blipFill>
-            <a:blip r:embed="rId6" cstate="print">
-              <a:lum bright="70000" contrast="-70000"/>
-              <a:extLst>
-                <a:ext uri="{28A0092B-C50C-407E-A947-70E740481C1C}">
-                  <a14:useLocalDpi xmlns:a14="http://schemas.microsoft.com/office/drawing/2010/main" val="0"/>
-                </a:ext>
-              </a:extLst>
-            </a:blip>
-            <a:stretch>
-              <a:fillRect/>
-            </a:stretch>
-          </p:blipFill>
-          <p:spPr>
-            <a:xfrm>
-              <a:off x="6803851" y="3197623"/>
-              <a:ext cx="1028093" cy="1028093"/>
-            </a:xfrm>
-            <a:prstGeom prst="rect">
-              <a:avLst/>
-            </a:prstGeom>
-          </p:spPr>
-        </p:pic>
-        <p:pic>
-          <p:nvPicPr>
-            <p:cNvPr id="18" name="Picture 17">
-              <a:extLst>
-                <a:ext uri="{FF2B5EF4-FFF2-40B4-BE49-F238E27FC236}">
-                  <a16:creationId xmlns:a16="http://schemas.microsoft.com/office/drawing/2014/main" id="{D2C20F46-7591-49D0-96C0-DE56454CF302}"/>
-                </a:ext>
-              </a:extLst>
-            </p:cNvPr>
-            <p:cNvPicPr>
-              <a:picLocks noChangeAspect="1"/>
-            </p:cNvPicPr>
-            <p:nvPr/>
-          </p:nvPicPr>
-          <p:blipFill>
-            <a:blip r:embed="rId7" cstate="print">
-              <a:lum bright="70000" contrast="-70000"/>
-              <a:extLst>
-                <a:ext uri="{28A0092B-C50C-407E-A947-70E740481C1C}">
-                  <a14:useLocalDpi xmlns:a14="http://schemas.microsoft.com/office/drawing/2010/main" val="0"/>
-                </a:ext>
-              </a:extLst>
-            </a:blip>
-            <a:stretch>
-              <a:fillRect/>
-            </a:stretch>
-          </p:blipFill>
-          <p:spPr>
-            <a:xfrm>
-              <a:off x="8714365" y="2656741"/>
-              <a:ext cx="780290" cy="780290"/>
-            </a:xfrm>
-            <a:prstGeom prst="rect">
-              <a:avLst/>
-            </a:prstGeom>
-          </p:spPr>
-        </p:pic>
-        <p:pic>
-          <p:nvPicPr>
-            <p:cNvPr id="20" name="Picture 19">
-              <a:extLst>
-                <a:ext uri="{FF2B5EF4-FFF2-40B4-BE49-F238E27FC236}">
-                  <a16:creationId xmlns:a16="http://schemas.microsoft.com/office/drawing/2014/main" id="{0CB4E9A6-9B61-450C-9361-70829B03F9FF}"/>
-                </a:ext>
-              </a:extLst>
-            </p:cNvPr>
-            <p:cNvPicPr>
-              <a:picLocks noChangeAspect="1"/>
-            </p:cNvPicPr>
-            <p:nvPr/>
-          </p:nvPicPr>
-          <p:blipFill>
-            <a:blip r:embed="rId7" cstate="print">
-              <a:lum bright="70000" contrast="-70000"/>
-              <a:extLst>
-                <a:ext uri="{28A0092B-C50C-407E-A947-70E740481C1C}">
-                  <a14:useLocalDpi xmlns:a14="http://schemas.microsoft.com/office/drawing/2010/main" val="0"/>
-                </a:ext>
-              </a:extLst>
-            </a:blip>
-            <a:stretch>
-              <a:fillRect/>
-            </a:stretch>
-          </p:blipFill>
-          <p:spPr>
-            <a:xfrm>
-              <a:off x="8714365" y="4028523"/>
-              <a:ext cx="780290" cy="780290"/>
-            </a:xfrm>
-            <a:prstGeom prst="rect">
-              <a:avLst/>
-            </a:prstGeom>
-          </p:spPr>
-        </p:pic>
-        <p:pic>
-          <p:nvPicPr>
-            <p:cNvPr id="22" name="Picture 21">
-              <a:extLst>
-                <a:ext uri="{FF2B5EF4-FFF2-40B4-BE49-F238E27FC236}">
-                  <a16:creationId xmlns:a16="http://schemas.microsoft.com/office/drawing/2014/main" id="{F5F012D0-86B4-4700-9138-4533C2EFDB3F}"/>
-                </a:ext>
-              </a:extLst>
-            </p:cNvPr>
-            <p:cNvPicPr>
-              <a:picLocks noChangeAspect="1"/>
-            </p:cNvPicPr>
-            <p:nvPr/>
-          </p:nvPicPr>
-          <p:blipFill>
-            <a:blip r:embed="rId8" cstate="print">
-              <a:lum bright="70000" contrast="-70000"/>
-              <a:extLst>
-                <a:ext uri="{28A0092B-C50C-407E-A947-70E740481C1C}">
-                  <a14:useLocalDpi xmlns:a14="http://schemas.microsoft.com/office/drawing/2010/main" val="0"/>
-                </a:ext>
-              </a:extLst>
-            </a:blip>
-            <a:stretch>
-              <a:fillRect/>
-            </a:stretch>
-          </p:blipFill>
-          <p:spPr>
-            <a:xfrm>
-              <a:off x="9494655" y="3303065"/>
-              <a:ext cx="780290" cy="780290"/>
-            </a:xfrm>
-            <a:prstGeom prst="rect">
-              <a:avLst/>
-            </a:prstGeom>
-          </p:spPr>
-        </p:pic>
-        <p:pic>
-          <p:nvPicPr>
-            <p:cNvPr id="25" name="Picture 24">
-              <a:extLst>
-                <a:ext uri="{FF2B5EF4-FFF2-40B4-BE49-F238E27FC236}">
-                  <a16:creationId xmlns:a16="http://schemas.microsoft.com/office/drawing/2014/main" id="{A9443E3C-542C-4F61-BF6F-57FFFA4CA4D2}"/>
-                </a:ext>
-              </a:extLst>
-            </p:cNvPr>
-            <p:cNvPicPr>
-              <a:picLocks noChangeAspect="1"/>
-            </p:cNvPicPr>
-            <p:nvPr/>
-          </p:nvPicPr>
-          <p:blipFill>
-            <a:blip r:embed="rId9" cstate="print">
-              <a:extLst>
-                <a:ext uri="{28A0092B-C50C-407E-A947-70E740481C1C}">
-                  <a14:useLocalDpi xmlns:a14="http://schemas.microsoft.com/office/drawing/2010/main" val="0"/>
-                </a:ext>
-              </a:extLst>
-            </a:blip>
-            <a:stretch>
-              <a:fillRect/>
-            </a:stretch>
-          </p:blipFill>
-          <p:spPr>
-            <a:xfrm>
-              <a:off x="5605036" y="5525378"/>
-              <a:ext cx="780290" cy="780290"/>
-            </a:xfrm>
-            <a:prstGeom prst="rect">
-              <a:avLst/>
-            </a:prstGeom>
-          </p:spPr>
-        </p:pic>
-        <p:sp>
-          <p:nvSpPr>
-            <p:cNvPr id="26" name="TextBox 25">
-              <a:extLst>
-                <a:ext uri="{FF2B5EF4-FFF2-40B4-BE49-F238E27FC236}">
-                  <a16:creationId xmlns:a16="http://schemas.microsoft.com/office/drawing/2014/main" id="{B0243E1C-F1B8-4DEC-AEAC-2BF9DBFA1351}"/>
-                </a:ext>
-              </a:extLst>
-            </p:cNvPr>
-            <p:cNvSpPr txBox="1"/>
-            <p:nvPr/>
-          </p:nvSpPr>
-          <p:spPr>
-            <a:xfrm>
-              <a:off x="6290779" y="5677804"/>
-              <a:ext cx="4823934" cy="627864"/>
-            </a:xfrm>
-            <a:prstGeom prst="rect">
-              <a:avLst/>
-            </a:prstGeom>
-            <a:noFill/>
-          </p:spPr>
-          <p:txBody>
-            <a:bodyPr wrap="square" lIns="182880" tIns="146304" rIns="182880" bIns="146304" rtlCol="0">
-              <a:spAutoFit/>
-            </a:bodyPr>
-            <a:lstStyle/>
-            <a:p>
-              <a:pPr>
-                <a:lnSpc>
-                  <a:spcPct val="90000"/>
-                </a:lnSpc>
-                <a:spcAft>
-                  <a:spcPts val="600"/>
-                </a:spcAft>
-              </a:pPr>
-              <a:r>
-                <a:rPr lang="en-US" sz="2400" dirty="0">
-                  <a:gradFill>
-                    <a:gsLst>
-                      <a:gs pos="2917">
-                        <a:schemeClr val="tx1"/>
-                      </a:gs>
-                      <a:gs pos="30000">
-                        <a:schemeClr val="tx1"/>
-                      </a:gs>
-                    </a:gsLst>
-                    <a:lin ang="5400000" scaled="0"/>
-                  </a:gradFill>
-                </a:rPr>
-                <a:t>Contoso Data Center (Dallas, TX)</a:t>
-              </a:r>
-            </a:p>
-          </p:txBody>
-        </p:sp>
-        <p:cxnSp>
-          <p:nvCxnSpPr>
-            <p:cNvPr id="28" name="Connector: Elbow 27">
-              <a:extLst>
-                <a:ext uri="{FF2B5EF4-FFF2-40B4-BE49-F238E27FC236}">
-                  <a16:creationId xmlns:a16="http://schemas.microsoft.com/office/drawing/2014/main" id="{DA03B9C4-085B-4844-B38D-6B58BAC7F5FD}"/>
-                </a:ext>
-              </a:extLst>
-            </p:cNvPr>
-            <p:cNvCxnSpPr>
-              <a:stCxn id="10" idx="3"/>
-              <a:endCxn id="14" idx="0"/>
-            </p:cNvCxnSpPr>
-            <p:nvPr/>
-          </p:nvCxnSpPr>
-          <p:spPr>
-            <a:xfrm>
-              <a:off x="5466323" y="3046886"/>
-              <a:ext cx="528858" cy="256179"/>
-            </a:xfrm>
-            <a:prstGeom prst="bentConnector2">
-              <a:avLst/>
-            </a:prstGeom>
-            <a:ln>
-              <a:solidFill>
-                <a:schemeClr val="tx1"/>
-              </a:solidFill>
-              <a:headEnd type="triangle"/>
-              <a:tailEnd type="triangle"/>
-            </a:ln>
-          </p:spPr>
-          <p:style>
-            <a:lnRef idx="1">
-              <a:schemeClr val="accent1"/>
-            </a:lnRef>
-            <a:fillRef idx="0">
-              <a:schemeClr val="accent1"/>
-            </a:fillRef>
-            <a:effectRef idx="0">
-              <a:schemeClr val="accent1"/>
-            </a:effectRef>
-            <a:fontRef idx="minor">
-              <a:schemeClr val="tx1"/>
-            </a:fontRef>
-          </p:style>
-        </p:cxnSp>
-        <p:cxnSp>
-          <p:nvCxnSpPr>
-            <p:cNvPr id="30" name="Connector: Elbow 29">
-              <a:extLst>
-                <a:ext uri="{FF2B5EF4-FFF2-40B4-BE49-F238E27FC236}">
-                  <a16:creationId xmlns:a16="http://schemas.microsoft.com/office/drawing/2014/main" id="{18208670-3A36-46B3-9CE3-BDA8118C91D2}"/>
-                </a:ext>
-              </a:extLst>
-            </p:cNvPr>
-            <p:cNvCxnSpPr>
-              <a:stCxn id="8" idx="3"/>
-              <a:endCxn id="14" idx="2"/>
-            </p:cNvCxnSpPr>
-            <p:nvPr/>
-          </p:nvCxnSpPr>
-          <p:spPr>
-            <a:xfrm flipV="1">
-              <a:off x="5466323" y="4083355"/>
-              <a:ext cx="528858" cy="264132"/>
-            </a:xfrm>
-            <a:prstGeom prst="bentConnector2">
-              <a:avLst/>
-            </a:prstGeom>
-            <a:ln>
-              <a:solidFill>
-                <a:schemeClr val="tx1"/>
-              </a:solidFill>
-              <a:headEnd type="triangle"/>
-              <a:tailEnd type="triangle"/>
-            </a:ln>
-          </p:spPr>
-          <p:style>
-            <a:lnRef idx="1">
-              <a:schemeClr val="accent1"/>
-            </a:lnRef>
-            <a:fillRef idx="0">
-              <a:schemeClr val="accent1"/>
-            </a:fillRef>
-            <a:effectRef idx="0">
-              <a:schemeClr val="accent1"/>
-            </a:effectRef>
-            <a:fontRef idx="minor">
-              <a:schemeClr val="tx1"/>
-            </a:fontRef>
-          </p:style>
-        </p:cxnSp>
-        <p:cxnSp>
-          <p:nvCxnSpPr>
-            <p:cNvPr id="32" name="Straight Arrow Connector 31">
-              <a:extLst>
-                <a:ext uri="{FF2B5EF4-FFF2-40B4-BE49-F238E27FC236}">
-                  <a16:creationId xmlns:a16="http://schemas.microsoft.com/office/drawing/2014/main" id="{D9BA9F4A-27CD-4168-84F8-348FC5706F32}"/>
-                </a:ext>
-              </a:extLst>
-            </p:cNvPr>
-            <p:cNvCxnSpPr>
-              <a:cxnSpLocks/>
-              <a:endCxn id="16" idx="1"/>
-            </p:cNvCxnSpPr>
-            <p:nvPr/>
-          </p:nvCxnSpPr>
-          <p:spPr>
-            <a:xfrm>
-              <a:off x="6381007" y="3711670"/>
-              <a:ext cx="422844" cy="0"/>
-            </a:xfrm>
-            <a:prstGeom prst="straightConnector1">
-              <a:avLst/>
-            </a:prstGeom>
-            <a:ln>
-              <a:solidFill>
-                <a:schemeClr val="tx1"/>
-              </a:solidFill>
-              <a:headEnd type="triangle"/>
-              <a:tailEnd type="triangle"/>
-            </a:ln>
-          </p:spPr>
-          <p:style>
-            <a:lnRef idx="1">
-              <a:schemeClr val="accent1"/>
-            </a:lnRef>
-            <a:fillRef idx="0">
-              <a:schemeClr val="accent1"/>
-            </a:fillRef>
-            <a:effectRef idx="0">
-              <a:schemeClr val="accent1"/>
-            </a:effectRef>
-            <a:fontRef idx="minor">
-              <a:schemeClr val="tx1"/>
-            </a:fontRef>
-          </p:style>
-        </p:cxnSp>
-        <p:cxnSp>
-          <p:nvCxnSpPr>
-            <p:cNvPr id="35" name="Connector: Elbow 34">
-              <a:extLst>
-                <a:ext uri="{FF2B5EF4-FFF2-40B4-BE49-F238E27FC236}">
-                  <a16:creationId xmlns:a16="http://schemas.microsoft.com/office/drawing/2014/main" id="{18B63CDB-5236-4FAF-8E5E-71DB8A2BABB4}"/>
-                </a:ext>
-              </a:extLst>
-            </p:cNvPr>
-            <p:cNvCxnSpPr>
-              <a:cxnSpLocks/>
-            </p:cNvCxnSpPr>
-            <p:nvPr/>
-          </p:nvCxnSpPr>
-          <p:spPr>
-            <a:xfrm flipV="1">
-              <a:off x="7831944" y="3707883"/>
-              <a:ext cx="1069870" cy="3787"/>
-            </a:xfrm>
-            <a:prstGeom prst="bentConnector3">
-              <a:avLst/>
-            </a:prstGeom>
-            <a:ln>
-              <a:solidFill>
-                <a:schemeClr val="tx1"/>
-              </a:solidFill>
-              <a:headEnd type="triangle"/>
-              <a:tailEnd type="triangle"/>
-            </a:ln>
-          </p:spPr>
-          <p:style>
-            <a:lnRef idx="1">
-              <a:schemeClr val="accent1"/>
-            </a:lnRef>
-            <a:fillRef idx="0">
-              <a:schemeClr val="accent1"/>
-            </a:fillRef>
-            <a:effectRef idx="0">
-              <a:schemeClr val="accent1"/>
-            </a:effectRef>
-            <a:fontRef idx="minor">
-              <a:schemeClr val="tx1"/>
-            </a:fontRef>
-          </p:style>
-        </p:cxnSp>
-      </p:grpSp>
+          <a:prstGeom prst="rect">
+            <a:avLst/>
+          </a:prstGeom>
+        </p:spPr>
+      </p:pic>
     </p:spTree>
     <p:extLst>
       <p:ext uri="{BB962C8B-B14F-4D97-AF65-F5344CB8AC3E}">
-        <p14:creationId xmlns:p14="http://schemas.microsoft.com/office/powerpoint/2010/main" val="2909394745"/>
+        <p14:creationId xmlns:p14="http://schemas.microsoft.com/office/powerpoint/2010/main" val="306804291"/>
       </p:ext>
     </p:extLst>
   </p:cSld>
@@ -24203,14 +23726,14 @@
           <a:lstStyle/>
           <a:p>
             <a:r>
-              <a:rPr lang="en-US" dirty="0"/>
+              <a:rPr lang="en-US"/>
               <a:t>Customer situation - Contoso Financial</a:t>
             </a:r>
             <a:br>
-              <a:rPr lang="en-US" dirty="0"/>
+              <a:rPr lang="en-US"/>
             </a:br>
             <a:br>
-              <a:rPr lang="en-US" dirty="0"/>
+              <a:rPr lang="en-US"/>
             </a:br>
             <a:endParaRPr lang="en-US" dirty="0"/>
           </a:p>
@@ -25279,4 +24802,270 @@
     </a:ext>
   </a:extLst>
 </a:theme>
+</file>
+
+<file path=customXml/item1.xml><?xml version="1.0" encoding="utf-8"?>
+<?mso-contentType ?>
+<FormTemplates xmlns="http://schemas.microsoft.com/sharepoint/v3/contenttype/forms">
+  <Display>DocumentLibraryForm</Display>
+  <Edit>DocumentLibraryForm</Edit>
+  <New>DocumentLibraryForm</New>
+</FormTemplates>
+</file>
+
+<file path=customXml/item2.xml><?xml version="1.0" encoding="utf-8"?>
+<p:properties xmlns:p="http://schemas.microsoft.com/office/2006/metadata/properties" xmlns:xsi="http://www.w3.org/2001/XMLSchema-instance" xmlns:pc="http://schemas.microsoft.com/office/infopath/2007/PartnerControls">
+  <documentManagement>
+    <_ip_UnifiedCompliancePolicyUIAction xmlns="http://schemas.microsoft.com/sharepoint/v3" xsi:nil="true"/>
+    <_ip_UnifiedCompliancePolicyProperties xmlns="http://schemas.microsoft.com/sharepoint/v3" xsi:nil="true"/>
+  </documentManagement>
+</p:properties>
+</file>
+
+<file path=customXml/item3.xml><?xml version="1.0" encoding="utf-8"?>
+<ct:contentTypeSchema xmlns:ct="http://schemas.microsoft.com/office/2006/metadata/contentType" xmlns:ma="http://schemas.microsoft.com/office/2006/metadata/properties/metaAttributes" ct:_="" ma:_="" ma:contentTypeName="Document" ma:contentTypeID="0x010100D15DFA3690A15B4081582BBCC6BEAC3E" ma:contentTypeVersion="9" ma:contentTypeDescription="Create a new document." ma:contentTypeScope="" ma:versionID="642da1784587cbe85a7fdbbe4dc36103">
+  <xsd:schema xmlns:xsd="http://www.w3.org/2001/XMLSchema" xmlns:xs="http://www.w3.org/2001/XMLSchema" xmlns:p="http://schemas.microsoft.com/office/2006/metadata/properties" xmlns:ns1="http://schemas.microsoft.com/sharepoint/v3" xmlns:ns2="2023ac63-7b75-4916-a9ee-591457758eee" xmlns:ns3="d9c797ad-d7c3-4982-82b7-81352a75e4a5" targetNamespace="http://schemas.microsoft.com/office/2006/metadata/properties" ma:root="true" ma:fieldsID="91198b0246576053cc55dd2c67035a89" ns1:_="" ns2:_="" ns3:_="">
+    <xsd:import namespace="http://schemas.microsoft.com/sharepoint/v3"/>
+    <xsd:import namespace="2023ac63-7b75-4916-a9ee-591457758eee"/>
+    <xsd:import namespace="d9c797ad-d7c3-4982-82b7-81352a75e4a5"/>
+    <xsd:element name="properties">
+      <xsd:complexType>
+        <xsd:sequence>
+          <xsd:element name="documentManagement">
+            <xsd:complexType>
+              <xsd:all>
+                <xsd:element ref="ns2:SharedWithUsers" minOccurs="0"/>
+                <xsd:element ref="ns2:SharedWithDetails" minOccurs="0"/>
+                <xsd:element ref="ns2:LastSharedByUser" minOccurs="0"/>
+                <xsd:element ref="ns2:LastSharedByTime" minOccurs="0"/>
+                <xsd:element ref="ns3:MediaServiceMetadata" minOccurs="0"/>
+                <xsd:element ref="ns3:MediaServiceFastMetadata" minOccurs="0"/>
+                <xsd:element ref="ns1:_ip_UnifiedCompliancePolicyProperties" minOccurs="0"/>
+                <xsd:element ref="ns1:_ip_UnifiedCompliancePolicyUIAction" minOccurs="0"/>
+                <xsd:element ref="ns3:MediaServiceDateTaken" minOccurs="0"/>
+              </xsd:all>
+            </xsd:complexType>
+          </xsd:element>
+        </xsd:sequence>
+      </xsd:complexType>
+    </xsd:element>
+  </xsd:schema>
+  <xsd:schema xmlns:xsd="http://www.w3.org/2001/XMLSchema" xmlns:xs="http://www.w3.org/2001/XMLSchema" xmlns:dms="http://schemas.microsoft.com/office/2006/documentManagement/types" xmlns:pc="http://schemas.microsoft.com/office/infopath/2007/PartnerControls" targetNamespace="http://schemas.microsoft.com/sharepoint/v3" elementFormDefault="qualified">
+    <xsd:import namespace="http://schemas.microsoft.com/office/2006/documentManagement/types"/>
+    <xsd:import namespace="http://schemas.microsoft.com/office/infopath/2007/PartnerControls"/>
+    <xsd:element name="_ip_UnifiedCompliancePolicyProperties" ma:index="14" nillable="true" ma:displayName="Unified Compliance Policy Properties" ma:description="" ma:hidden="true" ma:internalName="_ip_UnifiedCompliancePolicyProperties">
+      <xsd:simpleType>
+        <xsd:restriction base="dms:Note"/>
+      </xsd:simpleType>
+    </xsd:element>
+    <xsd:element name="_ip_UnifiedCompliancePolicyUIAction" ma:index="15" nillable="true" ma:displayName="Unified Compliance Policy UI Action" ma:description="" ma:hidden="true" ma:internalName="_ip_UnifiedCompliancePolicyUIAction">
+      <xsd:simpleType>
+        <xsd:restriction base="dms:Text"/>
+      </xsd:simpleType>
+    </xsd:element>
+  </xsd:schema>
+  <xsd:schema xmlns:xsd="http://www.w3.org/2001/XMLSchema" xmlns:xs="http://www.w3.org/2001/XMLSchema" xmlns:dms="http://schemas.microsoft.com/office/2006/documentManagement/types" xmlns:pc="http://schemas.microsoft.com/office/infopath/2007/PartnerControls" targetNamespace="2023ac63-7b75-4916-a9ee-591457758eee" elementFormDefault="qualified">
+    <xsd:import namespace="http://schemas.microsoft.com/office/2006/documentManagement/types"/>
+    <xsd:import namespace="http://schemas.microsoft.com/office/infopath/2007/PartnerControls"/>
+    <xsd:element name="SharedWithUsers" ma:index="8" nillable="true" ma:displayName="Shared With" ma:description="" ma:internalName="SharedWithUsers" ma:readOnly="true">
+      <xsd:complexType>
+        <xsd:complexContent>
+          <xsd:extension base="dms:UserMulti">
+            <xsd:sequence>
+              <xsd:element name="UserInfo" minOccurs="0" maxOccurs="unbounded">
+                <xsd:complexType>
+                  <xsd:sequence>
+                    <xsd:element name="DisplayName" type="xsd:string" minOccurs="0"/>
+                    <xsd:element name="AccountId" type="dms:UserId" minOccurs="0" nillable="true"/>
+                    <xsd:element name="AccountType" type="xsd:string" minOccurs="0"/>
+                  </xsd:sequence>
+                </xsd:complexType>
+              </xsd:element>
+            </xsd:sequence>
+          </xsd:extension>
+        </xsd:complexContent>
+      </xsd:complexType>
+    </xsd:element>
+    <xsd:element name="SharedWithDetails" ma:index="9" nillable="true" ma:displayName="Shared With Details" ma:description="" ma:internalName="SharedWithDetails" ma:readOnly="true">
+      <xsd:simpleType>
+        <xsd:restriction base="dms:Note">
+          <xsd:maxLength value="255"/>
+        </xsd:restriction>
+      </xsd:simpleType>
+    </xsd:element>
+    <xsd:element name="LastSharedByUser" ma:index="10" nillable="true" ma:displayName="Last Shared By User" ma:description="" ma:internalName="LastSharedByUser" ma:readOnly="true">
+      <xsd:simpleType>
+        <xsd:restriction base="dms:Note">
+          <xsd:maxLength value="255"/>
+        </xsd:restriction>
+      </xsd:simpleType>
+    </xsd:element>
+    <xsd:element name="LastSharedByTime" ma:index="11" nillable="true" ma:displayName="Last Shared By Time" ma:description="" ma:internalName="LastSharedByTime" ma:readOnly="true">
+      <xsd:simpleType>
+        <xsd:restriction base="dms:DateTime"/>
+      </xsd:simpleType>
+    </xsd:element>
+  </xsd:schema>
+  <xsd:schema xmlns:xsd="http://www.w3.org/2001/XMLSchema" xmlns:xs="http://www.w3.org/2001/XMLSchema" xmlns:dms="http://schemas.microsoft.com/office/2006/documentManagement/types" xmlns:pc="http://schemas.microsoft.com/office/infopath/2007/PartnerControls" targetNamespace="d9c797ad-d7c3-4982-82b7-81352a75e4a5" elementFormDefault="qualified">
+    <xsd:import namespace="http://schemas.microsoft.com/office/2006/documentManagement/types"/>
+    <xsd:import namespace="http://schemas.microsoft.com/office/infopath/2007/PartnerControls"/>
+    <xsd:element name="MediaServiceMetadata" ma:index="12" nillable="true" ma:displayName="MediaServiceMetadata" ma:description="" ma:hidden="true" ma:internalName="MediaServiceMetadata" ma:readOnly="true">
+      <xsd:simpleType>
+        <xsd:restriction base="dms:Note"/>
+      </xsd:simpleType>
+    </xsd:element>
+    <xsd:element name="MediaServiceFastMetadata" ma:index="13" nillable="true" ma:displayName="MediaServiceFastMetadata" ma:description="" ma:hidden="true" ma:internalName="MediaServiceFastMetadata" ma:readOnly="true">
+      <xsd:simpleType>
+        <xsd:restriction base="dms:Note"/>
+      </xsd:simpleType>
+    </xsd:element>
+    <xsd:element name="MediaServiceDateTaken" ma:index="16" nillable="true" ma:displayName="MediaServiceDateTaken" ma:hidden="true" ma:internalName="MediaServiceDateTaken" ma:readOnly="true">
+      <xsd:simpleType>
+        <xsd:restriction base="dms:Text"/>
+      </xsd:simpleType>
+    </xsd:element>
+  </xsd:schema>
+  <xsd:schema xmlns="http://schemas.openxmlformats.org/package/2006/metadata/core-properties" xmlns:xsd="http://www.w3.org/2001/XMLSchema" xmlns:xsi="http://www.w3.org/2001/XMLSchema-instance" xmlns:dc="http://purl.org/dc/elements/1.1/" xmlns:dcterms="http://purl.org/dc/terms/" xmlns:odoc="http://schemas.microsoft.com/internal/obd" targetNamespace="http://schemas.openxmlformats.org/package/2006/metadata/core-properties" elementFormDefault="qualified" attributeFormDefault="unqualified" blockDefault="#all">
+    <xsd:import namespace="http://purl.org/dc/elements/1.1/" schemaLocation="http://dublincore.org/schemas/xmls/qdc/2003/04/02/dc.xsd"/>
+    <xsd:import namespace="http://purl.org/dc/terms/" schemaLocation="http://dublincore.org/schemas/xmls/qdc/2003/04/02/dcterms.xsd"/>
+    <xsd:element name="coreProperties" type="CT_coreProperties"/>
+    <xsd:complexType name="CT_coreProperties">
+      <xsd:all>
+        <xsd:element ref="dc:creator" minOccurs="0" maxOccurs="1"/>
+        <xsd:element ref="dcterms:created" minOccurs="0" maxOccurs="1"/>
+        <xsd:element ref="dc:identifier" minOccurs="0" maxOccurs="1"/>
+        <xsd:element name="contentType" minOccurs="0" maxOccurs="1" type="xsd:string" ma:index="0" ma:displayName="Content Type"/>
+        <xsd:element ref="dc:title" minOccurs="0" maxOccurs="1" ma:index="4" ma:displayName="Title"/>
+        <xsd:element ref="dc:subject" minOccurs="0" maxOccurs="1"/>
+        <xsd:element ref="dc:description" minOccurs="0" maxOccurs="1"/>
+        <xsd:element name="keywords" minOccurs="0" maxOccurs="1" type="xsd:string"/>
+        <xsd:element ref="dc:language" minOccurs="0" maxOccurs="1"/>
+        <xsd:element name="category" minOccurs="0" maxOccurs="1" type="xsd:string"/>
+        <xsd:element name="version" minOccurs="0" maxOccurs="1" type="xsd:string"/>
+        <xsd:element name="revision" minOccurs="0" maxOccurs="1" type="xsd:string">
+          <xsd:annotation>
+            <xsd:documentation>
+                        This value indicates the number of saves or revisions. The application is responsible for updating this value after each revision.
+                    </xsd:documentation>
+          </xsd:annotation>
+        </xsd:element>
+        <xsd:element name="lastModifiedBy" minOccurs="0" maxOccurs="1" type="xsd:string"/>
+        <xsd:element ref="dcterms:modified" minOccurs="0" maxOccurs="1"/>
+        <xsd:element name="contentStatus" minOccurs="0" maxOccurs="1" type="xsd:string"/>
+      </xsd:all>
+    </xsd:complexType>
+  </xsd:schema>
+  <xs:schema xmlns:pc="http://schemas.microsoft.com/office/infopath/2007/PartnerControls" xmlns:xs="http://www.w3.org/2001/XMLSchema" targetNamespace="http://schemas.microsoft.com/office/infopath/2007/PartnerControls" elementFormDefault="qualified" attributeFormDefault="unqualified">
+    <xs:element name="Person">
+      <xs:complexType>
+        <xs:sequence>
+          <xs:element ref="pc:DisplayName" minOccurs="0"/>
+          <xs:element ref="pc:AccountId" minOccurs="0"/>
+          <xs:element ref="pc:AccountType" minOccurs="0"/>
+        </xs:sequence>
+      </xs:complexType>
+    </xs:element>
+    <xs:element name="DisplayName" type="xs:string"/>
+    <xs:element name="AccountId" type="xs:string"/>
+    <xs:element name="AccountType" type="xs:string"/>
+    <xs:element name="BDCAssociatedEntity">
+      <xs:complexType>
+        <xs:sequence>
+          <xs:element ref="pc:BDCEntity" minOccurs="0" maxOccurs="unbounded"/>
+        </xs:sequence>
+        <xs:attribute ref="pc:EntityNamespace"/>
+        <xs:attribute ref="pc:EntityName"/>
+        <xs:attribute ref="pc:SystemInstanceName"/>
+        <xs:attribute ref="pc:AssociationName"/>
+      </xs:complexType>
+    </xs:element>
+    <xs:attribute name="EntityNamespace" type="xs:string"/>
+    <xs:attribute name="EntityName" type="xs:string"/>
+    <xs:attribute name="SystemInstanceName" type="xs:string"/>
+    <xs:attribute name="AssociationName" type="xs:string"/>
+    <xs:element name="BDCEntity">
+      <xs:complexType>
+        <xs:sequence>
+          <xs:element ref="pc:EntityDisplayName" minOccurs="0"/>
+          <xs:element ref="pc:EntityInstanceReference" minOccurs="0"/>
+          <xs:element ref="pc:EntityId1" minOccurs="0"/>
+          <xs:element ref="pc:EntityId2" minOccurs="0"/>
+          <xs:element ref="pc:EntityId3" minOccurs="0"/>
+          <xs:element ref="pc:EntityId4" minOccurs="0"/>
+          <xs:element ref="pc:EntityId5" minOccurs="0"/>
+        </xs:sequence>
+      </xs:complexType>
+    </xs:element>
+    <xs:element name="EntityDisplayName" type="xs:string"/>
+    <xs:element name="EntityInstanceReference" type="xs:string"/>
+    <xs:element name="EntityId1" type="xs:string"/>
+    <xs:element name="EntityId2" type="xs:string"/>
+    <xs:element name="EntityId3" type="xs:string"/>
+    <xs:element name="EntityId4" type="xs:string"/>
+    <xs:element name="EntityId5" type="xs:string"/>
+    <xs:element name="Terms">
+      <xs:complexType>
+        <xs:sequence>
+          <xs:element ref="pc:TermInfo" minOccurs="0" maxOccurs="unbounded"/>
+        </xs:sequence>
+      </xs:complexType>
+    </xs:element>
+    <xs:element name="TermInfo">
+      <xs:complexType>
+        <xs:sequence>
+          <xs:element ref="pc:TermName" minOccurs="0"/>
+          <xs:element ref="pc:TermId" minOccurs="0"/>
+        </xs:sequence>
+      </xs:complexType>
+    </xs:element>
+    <xs:element name="TermName" type="xs:string"/>
+    <xs:element name="TermId" type="xs:string"/>
+  </xs:schema>
+</ct:contentTypeSchema>
+</file>
+
+<file path=customXml/itemProps1.xml><?xml version="1.0" encoding="utf-8"?>
+<ds:datastoreItem xmlns:ds="http://schemas.openxmlformats.org/officeDocument/2006/customXml" ds:itemID="{F18501AF-04CF-4482-BAE1-607B49DDC378}">
+  <ds:schemaRefs>
+    <ds:schemaRef ds:uri="http://schemas.microsoft.com/sharepoint/v3/contenttype/forms"/>
+  </ds:schemaRefs>
+</ds:datastoreItem>
+</file>
+
+<file path=customXml/itemProps2.xml><?xml version="1.0" encoding="utf-8"?>
+<ds:datastoreItem xmlns:ds="http://schemas.openxmlformats.org/officeDocument/2006/customXml" ds:itemID="{BAF7D529-36AB-45DA-B239-2F912F2D1610}">
+  <ds:schemaRefs>
+    <ds:schemaRef ds:uri="http://purl.org/dc/terms/"/>
+    <ds:schemaRef ds:uri="http://schemas.openxmlformats.org/package/2006/metadata/core-properties"/>
+    <ds:schemaRef ds:uri="http://purl.org/dc/dcmitype/"/>
+    <ds:schemaRef ds:uri="http://schemas.microsoft.com/office/infopath/2007/PartnerControls"/>
+    <ds:schemaRef ds:uri="2023ac63-7b75-4916-a9ee-591457758eee"/>
+    <ds:schemaRef ds:uri="http://purl.org/dc/elements/1.1/"/>
+    <ds:schemaRef ds:uri="http://schemas.microsoft.com/office/2006/metadata/properties"/>
+    <ds:schemaRef ds:uri="http://schemas.microsoft.com/office/2006/documentManagement/types"/>
+    <ds:schemaRef ds:uri="http://schemas.microsoft.com/sharepoint/v3"/>
+    <ds:schemaRef ds:uri="d9c797ad-d7c3-4982-82b7-81352a75e4a5"/>
+    <ds:schemaRef ds:uri="http://www.w3.org/XML/1998/namespace"/>
+  </ds:schemaRefs>
+</ds:datastoreItem>
+</file>
+
+<file path=customXml/itemProps3.xml><?xml version="1.0" encoding="utf-8"?>
+<ds:datastoreItem xmlns:ds="http://schemas.openxmlformats.org/officeDocument/2006/customXml" ds:itemID="{255F5BEB-6AD6-480A-8556-C80C5EBC10F2}">
+  <ds:schemaRefs>
+    <ds:schemaRef ds:uri="http://schemas.microsoft.com/office/2006/metadata/contentType"/>
+    <ds:schemaRef ds:uri="http://schemas.microsoft.com/office/2006/metadata/properties/metaAttributes"/>
+    <ds:schemaRef ds:uri="http://www.w3.org/2001/XMLSchema"/>
+    <ds:schemaRef ds:uri="http://schemas.microsoft.com/office/2006/metadata/properties"/>
+    <ds:schemaRef ds:uri="http://schemas.microsoft.com/sharepoint/v3"/>
+    <ds:schemaRef ds:uri="2023ac63-7b75-4916-a9ee-591457758eee"/>
+    <ds:schemaRef ds:uri="d9c797ad-d7c3-4982-82b7-81352a75e4a5"/>
+    <ds:schemaRef ds:uri="http://schemas.microsoft.com/office/2006/documentManagement/types"/>
+    <ds:schemaRef ds:uri="http://schemas.microsoft.com/office/infopath/2007/PartnerControls"/>
+    <ds:schemaRef ds:uri="http://schemas.openxmlformats.org/package/2006/metadata/core-properties"/>
+    <ds:schemaRef ds:uri="http://purl.org/dc/elements/1.1/"/>
+    <ds:schemaRef ds:uri="http://purl.org/dc/terms/"/>
+    <ds:schemaRef ds:uri="http://schemas.microsoft.com/internal/obd"/>
+  </ds:schemaRefs>
+</ds:datastoreItem>
 </file>
</xml_diff>